<commit_message>
Added css to home
</commit_message>
<xml_diff>
--- a/Quiz - Documentation/QuizApp - Business Case.pptx
+++ b/Quiz - Documentation/QuizApp - Business Case.pptx
@@ -39,22 +39,15 @@
       <p:boldItalic r:id="rId19"/>
     </p:embeddedFont>
     <p:embeddedFont>
-      <p:font typeface="Montserrat" panose="020B0604020202020204" charset="0"/>
+      <p:font typeface="Montserrat Light" panose="020B0604020202020204" charset="0"/>
       <p:regular r:id="rId20"/>
       <p:bold r:id="rId21"/>
       <p:italic r:id="rId22"/>
       <p:boldItalic r:id="rId23"/>
     </p:embeddedFont>
     <p:embeddedFont>
-      <p:font typeface="Montserrat Light" panose="020B0604020202020204" charset="0"/>
+      <p:font typeface="Wingdings 3" panose="05040102010807070707" pitchFamily="18" charset="2"/>
       <p:regular r:id="rId24"/>
-      <p:bold r:id="rId25"/>
-      <p:italic r:id="rId26"/>
-      <p:boldItalic r:id="rId27"/>
-    </p:embeddedFont>
-    <p:embeddedFont>
-      <p:font typeface="Wingdings 3" panose="05040102010807070707" pitchFamily="18" charset="2"/>
-      <p:regular r:id="rId28"/>
     </p:embeddedFont>
   </p:embeddedFontLst>
   <p:defaultTextStyle>
@@ -2669,7 +2662,7 @@
           <a:p>
             <a:fld id="{48A87A34-81AB-432B-8DAE-1953F412C126}" type="datetimeFigureOut">
               <a:rPr lang="en-US" smtClean="0"/>
-              <a:t>1/29/2021</a:t>
+              <a:t>1/31/2021</a:t>
             </a:fld>
             <a:endParaRPr lang="en-US" dirty="0"/>
           </a:p>
@@ -3759,7 +3752,7 @@
             <a:fld id="{48A87A34-81AB-432B-8DAE-1953F412C126}" type="datetimeFigureOut">
               <a:rPr lang="en-US" smtClean="0"/>
               <a:pPr/>
-              <a:t>1/29/2021</a:t>
+              <a:t>1/31/2021</a:t>
             </a:fld>
             <a:endParaRPr lang="en-US" dirty="0"/>
           </a:p>
@@ -4742,7 +4735,7 @@
             <a:fld id="{48A87A34-81AB-432B-8DAE-1953F412C126}" type="datetimeFigureOut">
               <a:rPr lang="en-US" smtClean="0"/>
               <a:pPr/>
-              <a:t>1/29/2021</a:t>
+              <a:t>1/31/2021</a:t>
             </a:fld>
             <a:endParaRPr lang="en-US" dirty="0"/>
           </a:p>
@@ -5879,7 +5872,7 @@
             <a:fld id="{48A87A34-81AB-432B-8DAE-1953F412C126}" type="datetimeFigureOut">
               <a:rPr lang="en-US" smtClean="0"/>
               <a:pPr/>
-              <a:t>1/29/2021</a:t>
+              <a:t>1/31/2021</a:t>
             </a:fld>
             <a:endParaRPr lang="en-US" dirty="0"/>
           </a:p>
@@ -6915,7 +6908,7 @@
             <a:fld id="{48A87A34-81AB-432B-8DAE-1953F412C126}" type="datetimeFigureOut">
               <a:rPr lang="en-US" smtClean="0"/>
               <a:pPr/>
-              <a:t>1/29/2021</a:t>
+              <a:t>1/31/2021</a:t>
             </a:fld>
             <a:endParaRPr lang="en-US" dirty="0"/>
           </a:p>
@@ -7578,7 +7571,7 @@
             <a:fld id="{48A87A34-81AB-432B-8DAE-1953F412C126}" type="datetimeFigureOut">
               <a:rPr lang="en-US" smtClean="0"/>
               <a:pPr/>
-              <a:t>1/29/2021</a:t>
+              <a:t>1/31/2021</a:t>
             </a:fld>
             <a:endParaRPr lang="en-US" dirty="0"/>
           </a:p>
@@ -8442,7 +8435,7 @@
             <a:fld id="{48A87A34-81AB-432B-8DAE-1953F412C126}" type="datetimeFigureOut">
               <a:rPr lang="en-US" smtClean="0"/>
               <a:pPr/>
-              <a:t>1/29/2021</a:t>
+              <a:t>1/31/2021</a:t>
             </a:fld>
             <a:endParaRPr lang="en-US" dirty="0"/>
           </a:p>
@@ -8634,7 +8627,7 @@
           <a:p>
             <a:fld id="{48A87A34-81AB-432B-8DAE-1953F412C126}" type="datetimeFigureOut">
               <a:rPr lang="en-US" smtClean="0"/>
-              <a:t>1/29/2021</a:t>
+              <a:t>1/31/2021</a:t>
             </a:fld>
             <a:endParaRPr lang="en-US" dirty="0"/>
           </a:p>
@@ -9607,7 +9600,7 @@
           <a:p>
             <a:fld id="{48A87A34-81AB-432B-8DAE-1953F412C126}" type="datetimeFigureOut">
               <a:rPr lang="en-US" smtClean="0"/>
-              <a:t>1/29/2021</a:t>
+              <a:t>1/31/2021</a:t>
             </a:fld>
             <a:endParaRPr lang="en-US" dirty="0"/>
           </a:p>
@@ -10385,7 +10378,7 @@
           <a:p>
             <a:fld id="{48A87A34-81AB-432B-8DAE-1953F412C126}" type="datetimeFigureOut">
               <a:rPr lang="en-US" smtClean="0"/>
-              <a:t>1/29/2021</a:t>
+              <a:t>1/31/2021</a:t>
             </a:fld>
             <a:endParaRPr lang="en-US" dirty="0"/>
           </a:p>
@@ -11420,7 +11413,7 @@
           <a:p>
             <a:fld id="{48A87A34-81AB-432B-8DAE-1953F412C126}" type="datetimeFigureOut">
               <a:rPr lang="en-US" smtClean="0"/>
-              <a:t>1/29/2021</a:t>
+              <a:t>1/31/2021</a:t>
             </a:fld>
             <a:endParaRPr lang="en-US" dirty="0"/>
           </a:p>
@@ -11693,7 +11686,7 @@
           <a:p>
             <a:fld id="{48A87A34-81AB-432B-8DAE-1953F412C126}" type="datetimeFigureOut">
               <a:rPr lang="en-US" smtClean="0"/>
-              <a:t>1/29/2021</a:t>
+              <a:t>1/31/2021</a:t>
             </a:fld>
             <a:endParaRPr lang="en-US" dirty="0"/>
           </a:p>
@@ -12104,7 +12097,7 @@
           <a:p>
             <a:fld id="{48A87A34-81AB-432B-8DAE-1953F412C126}" type="datetimeFigureOut">
               <a:rPr lang="en-US" smtClean="0"/>
-              <a:t>1/29/2021</a:t>
+              <a:t>1/31/2021</a:t>
             </a:fld>
             <a:endParaRPr lang="en-US" dirty="0"/>
           </a:p>
@@ -12232,7 +12225,7 @@
           <a:p>
             <a:fld id="{48A87A34-81AB-432B-8DAE-1953F412C126}" type="datetimeFigureOut">
               <a:rPr lang="en-US" smtClean="0"/>
-              <a:t>1/29/2021</a:t>
+              <a:t>1/31/2021</a:t>
             </a:fld>
             <a:endParaRPr lang="en-US" dirty="0"/>
           </a:p>
@@ -12328,7 +12321,7 @@
           <a:p>
             <a:fld id="{48A87A34-81AB-432B-8DAE-1953F412C126}" type="datetimeFigureOut">
               <a:rPr lang="en-US" smtClean="0"/>
-              <a:t>1/29/2021</a:t>
+              <a:t>1/31/2021</a:t>
             </a:fld>
             <a:endParaRPr lang="en-US" dirty="0"/>
           </a:p>
@@ -13410,7 +13403,7 @@
           <a:p>
             <a:fld id="{48A87A34-81AB-432B-8DAE-1953F412C126}" type="datetimeFigureOut">
               <a:rPr lang="en-US" smtClean="0"/>
-              <a:t>1/29/2021</a:t>
+              <a:t>1/31/2021</a:t>
             </a:fld>
             <a:endParaRPr lang="en-US" dirty="0"/>
           </a:p>
@@ -14520,7 +14513,7 @@
             <a:fld id="{48A87A34-81AB-432B-8DAE-1953F412C126}" type="datetimeFigureOut">
               <a:rPr lang="en-US" smtClean="0"/>
               <a:pPr/>
-              <a:t>1/29/2021</a:t>
+              <a:t>1/31/2021</a:t>
             </a:fld>
             <a:endParaRPr lang="en-US" dirty="0"/>
           </a:p>
@@ -15519,7 +15512,7 @@
             <a:fld id="{48A87A34-81AB-432B-8DAE-1953F412C126}" type="datetimeFigureOut">
               <a:rPr lang="en-US" smtClean="0"/>
               <a:pPr/>
-              <a:t>1/29/2021</a:t>
+              <a:t>1/31/2021</a:t>
             </a:fld>
             <a:endParaRPr lang="en-US" dirty="0"/>
           </a:p>
@@ -16124,7 +16117,7 @@
         </p:nvSpPr>
         <p:spPr>
           <a:xfrm>
-            <a:off x="643697" y="4670884"/>
+            <a:off x="885549" y="4064395"/>
             <a:ext cx="5210451" cy="1282402"/>
           </a:xfrm>
           <a:prstGeom prst="rect">
@@ -16154,18 +16147,21 @@
               <a:buNone/>
             </a:pPr>
             <a:r>
-              <a:rPr lang="en-GB" sz="4400" b="1" i="0" u="none" strike="noStrike" cap="none" dirty="0">
+              <a:rPr lang="en-GB" sz="5400" b="1" i="0" u="none" strike="noStrike" cap="none" dirty="0">
                 <a:solidFill>
                   <a:srgbClr val="FFFFFF"/>
                 </a:solidFill>
-                <a:latin typeface="Montserrat"/>
+                <a:latin typeface="Calibri" panose="020F0502020204030204" pitchFamily="34" charset="0"/>
                 <a:ea typeface="Montserrat"/>
-                <a:cs typeface="Montserrat"/>
+                <a:cs typeface="Calibri" panose="020F0502020204030204" pitchFamily="34" charset="0"/>
                 <a:sym typeface="Montserrat"/>
               </a:rPr>
               <a:t>Business Case</a:t>
             </a:r>
-            <a:endParaRPr lang="en-GB" dirty="0"/>
+            <a:endParaRPr lang="en-GB" sz="5400" dirty="0">
+              <a:latin typeface="Calibri" panose="020F0502020204030204" pitchFamily="34" charset="0"/>
+              <a:cs typeface="Calibri" panose="020F0502020204030204" pitchFamily="34" charset="0"/>
+            </a:endParaRPr>
           </a:p>
           <a:p>
             <a:pPr marL="0" marR="0" lvl="0" indent="0" algn="l" rtl="0">
@@ -16181,30 +16177,33 @@
               <a:buNone/>
             </a:pPr>
             <a:r>
-              <a:rPr lang="en-GB" sz="4800" b="0" i="0" u="none" strike="noStrike" cap="none" dirty="0">
+              <a:rPr lang="en-GB" sz="5400" b="0" i="0" u="none" strike="noStrike" cap="none" dirty="0">
                 <a:solidFill>
                   <a:srgbClr val="FFFFFF"/>
                 </a:solidFill>
-                <a:latin typeface="Montserrat Light"/>
+                <a:latin typeface="Calibri Light" panose="020F0302020204030204" pitchFamily="34" charset="0"/>
                 <a:ea typeface="Montserrat Light"/>
-                <a:cs typeface="Montserrat Light"/>
+                <a:cs typeface="Calibri Light" panose="020F0302020204030204" pitchFamily="34" charset="0"/>
                 <a:sym typeface="Montserrat Light"/>
               </a:rPr>
               <a:t>for </a:t>
             </a:r>
             <a:r>
-              <a:rPr lang="en-GB" sz="4400" b="1" i="0" u="none" strike="noStrike" cap="none" dirty="0">
+              <a:rPr lang="en-GB" sz="5400" b="1" i="0" u="none" strike="noStrike" cap="none" dirty="0">
                 <a:solidFill>
                   <a:srgbClr val="FFFFFF"/>
                 </a:solidFill>
-                <a:latin typeface="Montserrat"/>
+                <a:latin typeface="Calibri" panose="020F0502020204030204" pitchFamily="34" charset="0"/>
                 <a:ea typeface="Montserrat"/>
-                <a:cs typeface="Montserrat"/>
+                <a:cs typeface="Calibri" panose="020F0502020204030204" pitchFamily="34" charset="0"/>
                 <a:sym typeface="Montserrat"/>
               </a:rPr>
               <a:t>Quizzing App</a:t>
             </a:r>
-            <a:endParaRPr lang="en-GB" dirty="0"/>
+            <a:endParaRPr lang="en-GB" sz="5400" dirty="0">
+              <a:latin typeface="Calibri" panose="020F0502020204030204" pitchFamily="34" charset="0"/>
+              <a:cs typeface="Calibri" panose="020F0502020204030204" pitchFamily="34" charset="0"/>
+            </a:endParaRPr>
           </a:p>
         </p:txBody>
       </p:sp>
@@ -16428,7 +16427,7 @@
                 <a:cs typeface="Calibri" panose="020F0502020204030204" pitchFamily="34" charset="0"/>
                 <a:sym typeface="Montserrat Light"/>
               </a:rPr>
-              <a:t>We understand how your business works.</a:t>
+              <a:t>How the business works.</a:t>
             </a:r>
             <a:endParaRPr dirty="0">
               <a:solidFill>
@@ -16448,8 +16447,8 @@
         </p:nvSpPr>
         <p:spPr>
           <a:xfrm>
-            <a:off x="358219" y="1640264"/>
-            <a:ext cx="4675694" cy="4616648"/>
+            <a:off x="358218" y="1640264"/>
+            <a:ext cx="8869757" cy="4616648"/>
           </a:xfrm>
           <a:prstGeom prst="rect">
             <a:avLst/>
@@ -16516,7 +16515,105 @@
                 <a:cs typeface="Calibri" panose="020F0502020204030204" pitchFamily="34" charset="0"/>
                 <a:sym typeface="Calibri"/>
               </a:rPr>
-              <a:t>You have to order in advance 24 hours unless pizzas &gt;100 then 5 day notice.</a:t>
+              <a:t>Administration staff needs a web application to add, edit delete a read quizzes.</a:t>
+            </a:r>
+          </a:p>
+          <a:p>
+            <a:pPr marL="171450" marR="0" lvl="0" indent="-171450" algn="l" rtl="0">
+              <a:spcBef>
+                <a:spcPts val="0"/>
+              </a:spcBef>
+              <a:spcAft>
+                <a:spcPts val="0"/>
+              </a:spcAft>
+              <a:buClr>
+                <a:schemeClr val="dk1"/>
+              </a:buClr>
+              <a:buSzPts val="1400"/>
+              <a:buFont typeface="Calibri"/>
+              <a:buChar char="-"/>
+            </a:pPr>
+            <a:r>
+              <a:rPr lang="en-GB" sz="1400" dirty="0">
+                <a:solidFill>
+                  <a:schemeClr val="dk1"/>
+                </a:solidFill>
+                <a:latin typeface="Calibri" panose="020F0502020204030204" pitchFamily="34" charset="0"/>
+                <a:cs typeface="Calibri" panose="020F0502020204030204" pitchFamily="34" charset="0"/>
+                <a:sym typeface="Calibri"/>
+              </a:rPr>
+              <a:t>This application will be access for admin staff but also for outside the organisation users.</a:t>
+            </a:r>
+          </a:p>
+          <a:p>
+            <a:pPr marL="171450" marR="0" lvl="0" indent="-171450" algn="l" rtl="0">
+              <a:spcBef>
+                <a:spcPts val="0"/>
+              </a:spcBef>
+              <a:spcAft>
+                <a:spcPts val="0"/>
+              </a:spcAft>
+              <a:buClr>
+                <a:schemeClr val="dk1"/>
+              </a:buClr>
+              <a:buSzPts val="1400"/>
+              <a:buFont typeface="Calibri"/>
+              <a:buChar char="-"/>
+            </a:pPr>
+            <a:r>
+              <a:rPr lang="en-GB" sz="1400" dirty="0">
+                <a:solidFill>
+                  <a:schemeClr val="dk1"/>
+                </a:solidFill>
+                <a:latin typeface="Calibri" panose="020F0502020204030204" pitchFamily="34" charset="0"/>
+                <a:cs typeface="Calibri" panose="020F0502020204030204" pitchFamily="34" charset="0"/>
+                <a:sym typeface="Calibri"/>
+              </a:rPr>
+              <a:t>Outside organisation users can find the web application online – e.g. search engines and app stores such as </a:t>
+            </a:r>
+            <a:r>
+              <a:rPr lang="en-GB" sz="1400" dirty="0" err="1">
+                <a:solidFill>
+                  <a:schemeClr val="dk1"/>
+                </a:solidFill>
+                <a:latin typeface="Calibri" panose="020F0502020204030204" pitchFamily="34" charset="0"/>
+                <a:cs typeface="Calibri" panose="020F0502020204030204" pitchFamily="34" charset="0"/>
+                <a:sym typeface="Calibri"/>
+              </a:rPr>
+              <a:t>PlayStore</a:t>
+            </a:r>
+            <a:r>
+              <a:rPr lang="en-GB" sz="1400" dirty="0">
+                <a:solidFill>
+                  <a:schemeClr val="dk1"/>
+                </a:solidFill>
+                <a:latin typeface="Calibri" panose="020F0502020204030204" pitchFamily="34" charset="0"/>
+                <a:cs typeface="Calibri" panose="020F0502020204030204" pitchFamily="34" charset="0"/>
+                <a:sym typeface="Calibri"/>
+              </a:rPr>
+              <a:t> or </a:t>
+            </a:r>
+            <a:r>
+              <a:rPr lang="en-GB" sz="1400" dirty="0" err="1">
+                <a:solidFill>
+                  <a:schemeClr val="dk1"/>
+                </a:solidFill>
+                <a:latin typeface="Calibri" panose="020F0502020204030204" pitchFamily="34" charset="0"/>
+                <a:cs typeface="Calibri" panose="020F0502020204030204" pitchFamily="34" charset="0"/>
+                <a:sym typeface="Calibri"/>
+              </a:rPr>
+              <a:t>AppleStore</a:t>
+            </a:r>
+            <a:r>
+              <a:rPr lang="en-GB" sz="1400" dirty="0">
+                <a:solidFill>
+                  <a:schemeClr val="dk1"/>
+                </a:solidFill>
+                <a:latin typeface="Calibri" panose="020F0502020204030204" pitchFamily="34" charset="0"/>
+                <a:cs typeface="Calibri" panose="020F0502020204030204" pitchFamily="34" charset="0"/>
+                <a:sym typeface="Calibri"/>
+              </a:rPr>
+              <a:t>.</a:t>
             </a:r>
             <a:endParaRPr dirty="0">
               <a:latin typeface="Calibri" panose="020F0502020204030204" pitchFamily="34" charset="0"/>
@@ -17103,10 +17200,16 @@
               <a:buNone/>
             </a:pPr>
             <a:r>
-              <a:rPr lang="en-GB" dirty="0"/>
+              <a:rPr lang="en-GB" dirty="0">
+                <a:latin typeface="Calibri Light" panose="020F0302020204030204" pitchFamily="34" charset="0"/>
+                <a:cs typeface="Calibri Light" panose="020F0302020204030204" pitchFamily="34" charset="0"/>
+              </a:rPr>
               <a:t>QUIZZING  APP – BUSINESS CASE</a:t>
             </a:r>
-            <a:endParaRPr dirty="0"/>
+            <a:endParaRPr dirty="0">
+              <a:latin typeface="Calibri Light" panose="020F0302020204030204" pitchFamily="34" charset="0"/>
+              <a:cs typeface="Calibri Light" panose="020F0302020204030204" pitchFamily="34" charset="0"/>
+            </a:endParaRPr>
           </a:p>
         </p:txBody>
       </p:sp>
@@ -17156,22 +17259,34 @@
               <a:buNone/>
             </a:pPr>
             <a:r>
-              <a:rPr lang="en-GB" b="1">
-                <a:latin typeface="Montserrat"/>
+              <a:rPr lang="en-GB" dirty="0">
+                <a:solidFill>
+                  <a:srgbClr val="0070C0"/>
+                </a:solidFill>
+                <a:latin typeface="Calibri" panose="020F0502020204030204" pitchFamily="34" charset="0"/>
                 <a:ea typeface="Montserrat"/>
-                <a:cs typeface="Montserrat"/>
+                <a:cs typeface="Calibri" panose="020F0502020204030204" pitchFamily="34" charset="0"/>
                 <a:sym typeface="Montserrat"/>
               </a:rPr>
               <a:t>Technical</a:t>
             </a:r>
             <a:r>
-              <a:rPr lang="en-GB"/>
+              <a:rPr lang="en-GB" dirty="0">
+                <a:solidFill>
+                  <a:srgbClr val="0070C0"/>
+                </a:solidFill>
+                <a:latin typeface="Calibri" panose="020F0502020204030204" pitchFamily="34" charset="0"/>
+                <a:cs typeface="Calibri" panose="020F0502020204030204" pitchFamily="34" charset="0"/>
+              </a:rPr>
               <a:t> feasibility</a:t>
             </a:r>
-            <a:endParaRPr b="1">
-              <a:latin typeface="Montserrat"/>
+            <a:endParaRPr dirty="0">
+              <a:solidFill>
+                <a:srgbClr val="0070C0"/>
+              </a:solidFill>
+              <a:latin typeface="Calibri" panose="020F0502020204030204" pitchFamily="34" charset="0"/>
               <a:ea typeface="Montserrat"/>
-              <a:cs typeface="Montserrat"/>
+              <a:cs typeface="Calibri" panose="020F0502020204030204" pitchFamily="34" charset="0"/>
               <a:sym typeface="Montserrat"/>
             </a:endParaRPr>
           </a:p>
@@ -17212,18 +17327,24 @@
               <a:buNone/>
             </a:pPr>
             <a:r>
-              <a:rPr lang="en-GB" sz="1400">
+              <a:rPr lang="en-GB" sz="1400" dirty="0">
                 <a:solidFill>
-                  <a:srgbClr val="1396AE"/>
+                  <a:srgbClr val="0070C0"/>
                 </a:solidFill>
-                <a:latin typeface="Montserrat Light"/>
+                <a:latin typeface="Calibri" panose="020F0502020204030204" pitchFamily="34" charset="0"/>
                 <a:ea typeface="Montserrat Light"/>
-                <a:cs typeface="Montserrat Light"/>
+                <a:cs typeface="Calibri" panose="020F0502020204030204" pitchFamily="34" charset="0"/>
                 <a:sym typeface="Montserrat Light"/>
               </a:rPr>
               <a:t>We have identified the main technical risks of the project</a:t>
             </a:r>
-            <a:endParaRPr/>
+            <a:endParaRPr dirty="0">
+              <a:solidFill>
+                <a:srgbClr val="0070C0"/>
+              </a:solidFill>
+              <a:latin typeface="Calibri" panose="020F0502020204030204" pitchFamily="34" charset="0"/>
+              <a:cs typeface="Calibri" panose="020F0502020204030204" pitchFamily="34" charset="0"/>
+            </a:endParaRPr>
           </a:p>
         </p:txBody>
       </p:sp>
@@ -17266,14 +17387,17 @@
                 <a:solidFill>
                   <a:schemeClr val="dk1"/>
                 </a:solidFill>
-                <a:latin typeface="Calibri"/>
+                <a:latin typeface="Calibri" panose="020F0502020204030204" pitchFamily="34" charset="0"/>
                 <a:ea typeface="Calibri"/>
-                <a:cs typeface="Calibri"/>
+                <a:cs typeface="Calibri" panose="020F0502020204030204" pitchFamily="34" charset="0"/>
                 <a:sym typeface="Calibri"/>
               </a:rPr>
               <a:t>Technical risks of the project?:</a:t>
             </a:r>
-            <a:endParaRPr dirty="0"/>
+            <a:endParaRPr dirty="0">
+              <a:latin typeface="Calibri" panose="020F0502020204030204" pitchFamily="34" charset="0"/>
+              <a:cs typeface="Calibri" panose="020F0502020204030204" pitchFamily="34" charset="0"/>
+            </a:endParaRPr>
           </a:p>
           <a:p>
             <a:pPr marL="0" marR="0" lvl="0" indent="0" algn="l" rtl="0">
@@ -17290,9 +17414,9 @@
                 <a:solidFill>
                   <a:schemeClr val="dk1"/>
                 </a:solidFill>
-                <a:latin typeface="Calibri"/>
+                <a:latin typeface="Calibri" panose="020F0502020204030204" pitchFamily="34" charset="0"/>
                 <a:ea typeface="Calibri"/>
-                <a:cs typeface="Calibri"/>
+                <a:cs typeface="Calibri" panose="020F0502020204030204" pitchFamily="34" charset="0"/>
                 <a:sym typeface="Calibri"/>
               </a:rPr>
               <a:t>User cannot find the app on internet</a:t>
@@ -17318,24 +17442,12 @@
                 <a:solidFill>
                   <a:schemeClr val="dk1"/>
                 </a:solidFill>
-                <a:latin typeface="Calibri"/>
+                <a:latin typeface="Calibri" panose="020F0502020204030204" pitchFamily="34" charset="0"/>
                 <a:ea typeface="Calibri"/>
-                <a:cs typeface="Calibri"/>
+                <a:cs typeface="Calibri" panose="020F0502020204030204" pitchFamily="34" charset="0"/>
                 <a:sym typeface="Calibri"/>
               </a:rPr>
-              <a:t>Ask Bulk Pizzas if they have any system currently for when they get </a:t>
-            </a:r>
-            <a:r>
-              <a:rPr lang="en-GB" sz="1400">
-                <a:solidFill>
-                  <a:schemeClr val="dk1"/>
-                </a:solidFill>
-                <a:latin typeface="Calibri"/>
-                <a:ea typeface="Calibri"/>
-                <a:cs typeface="Calibri"/>
-                <a:sym typeface="Calibri"/>
-              </a:rPr>
-              <a:t>overbooked.</a:t>
+              <a:t>Ask Bulk Pizzas if they have any system currently for when they get overbooked.</a:t>
             </a:r>
           </a:p>
           <a:p>
@@ -17351,7 +17463,10 @@
               </a:buClr>
               <a:buSzPts val="1400"/>
             </a:pPr>
-            <a:endParaRPr dirty="0"/>
+            <a:endParaRPr dirty="0">
+              <a:latin typeface="Calibri" panose="020F0502020204030204" pitchFamily="34" charset="0"/>
+              <a:cs typeface="Calibri" panose="020F0502020204030204" pitchFamily="34" charset="0"/>
+            </a:endParaRPr>
           </a:p>
           <a:p>
             <a:pPr marL="0" marR="0" lvl="0" indent="0" algn="l" rtl="0">
@@ -17368,14 +17483,17 @@
                 <a:solidFill>
                   <a:schemeClr val="dk1"/>
                 </a:solidFill>
-                <a:latin typeface="Calibri"/>
+                <a:latin typeface="Calibri" panose="020F0502020204030204" pitchFamily="34" charset="0"/>
                 <a:ea typeface="Calibri"/>
-                <a:cs typeface="Calibri"/>
+                <a:cs typeface="Calibri" panose="020F0502020204030204" pitchFamily="34" charset="0"/>
                 <a:sym typeface="Calibri"/>
               </a:rPr>
               <a:t>Random order for questions and answers might need of an specially design algorithm</a:t>
             </a:r>
-            <a:endParaRPr dirty="0"/>
+            <a:endParaRPr dirty="0">
+              <a:latin typeface="Calibri" panose="020F0502020204030204" pitchFamily="34" charset="0"/>
+              <a:cs typeface="Calibri" panose="020F0502020204030204" pitchFamily="34" charset="0"/>
+            </a:endParaRPr>
           </a:p>
           <a:p>
             <a:pPr marL="285750" marR="0" lvl="0" indent="-285750" algn="l" rtl="0">
@@ -17397,9 +17515,9 @@
                 <a:solidFill>
                   <a:schemeClr val="dk1"/>
                 </a:solidFill>
-                <a:latin typeface="Calibri"/>
+                <a:latin typeface="Calibri" panose="020F0502020204030204" pitchFamily="34" charset="0"/>
                 <a:ea typeface="Calibri"/>
-                <a:cs typeface="Calibri"/>
+                <a:cs typeface="Calibri" panose="020F0502020204030204" pitchFamily="34" charset="0"/>
                 <a:sym typeface="Calibri"/>
               </a:rPr>
               <a:t>Ask Bulk Pizzas for the technical documentation for their invoice system.</a:t>
@@ -17422,9 +17540,9 @@
               <a:solidFill>
                 <a:schemeClr val="dk1"/>
               </a:solidFill>
-              <a:latin typeface="Calibri"/>
+              <a:latin typeface="Calibri" panose="020F0502020204030204" pitchFamily="34" charset="0"/>
               <a:ea typeface="Calibri"/>
-              <a:cs typeface="Calibri"/>
+              <a:cs typeface="Calibri" panose="020F0502020204030204" pitchFamily="34" charset="0"/>
               <a:sym typeface="Calibri"/>
             </a:endParaRPr>
           </a:p>
@@ -17445,7 +17563,7 @@
                 <a:latin typeface="Calibri" panose="020F0502020204030204" pitchFamily="34" charset="0"/>
                 <a:cs typeface="Calibri" panose="020F0502020204030204" pitchFamily="34" charset="0"/>
               </a:rPr>
-              <a:t>The form to create or edit quizzes can get too long and we need it to be easy to use and will need to give the user flexibility when adding questions to a quiz.</a:t>
+              <a:t>The form to create or edit quizzes can get too long; we need it to be easy to use and will need to give the user flexibility when adding questions to a quiz.</a:t>
             </a:r>
           </a:p>
           <a:p>
@@ -17576,9 +17694,9 @@
               <a:solidFill>
                 <a:schemeClr val="dk1"/>
               </a:solidFill>
-              <a:latin typeface="Calibri"/>
+              <a:latin typeface="Calibri" panose="020F0502020204030204" pitchFamily="34" charset="0"/>
               <a:ea typeface="Calibri"/>
-              <a:cs typeface="Calibri"/>
+              <a:cs typeface="Calibri" panose="020F0502020204030204" pitchFamily="34" charset="0"/>
               <a:sym typeface="Calibri"/>
             </a:endParaRPr>
           </a:p>
@@ -17655,10 +17773,16 @@
               <a:buNone/>
             </a:pPr>
             <a:r>
-              <a:rPr lang="en-GB" dirty="0"/>
+              <a:rPr lang="en-GB" dirty="0">
+                <a:latin typeface="Calibri Light" panose="020F0302020204030204" pitchFamily="34" charset="0"/>
+                <a:cs typeface="Calibri Light" panose="020F0302020204030204" pitchFamily="34" charset="0"/>
+              </a:rPr>
               <a:t>QUIZZING  APP – BUSINESS CASE</a:t>
             </a:r>
-            <a:endParaRPr dirty="0"/>
+            <a:endParaRPr dirty="0">
+              <a:latin typeface="Calibri Light" panose="020F0302020204030204" pitchFamily="34" charset="0"/>
+              <a:cs typeface="Calibri Light" panose="020F0302020204030204" pitchFamily="34" charset="0"/>
+            </a:endParaRPr>
           </a:p>
         </p:txBody>
       </p:sp>
@@ -17708,22 +17832,34 @@
               <a:buNone/>
             </a:pPr>
             <a:r>
-              <a:rPr lang="en-GB" b="1">
-                <a:latin typeface="Montserrat"/>
+              <a:rPr lang="en-GB" dirty="0">
+                <a:solidFill>
+                  <a:srgbClr val="0070C0"/>
+                </a:solidFill>
+                <a:latin typeface="Calibri" panose="020F0502020204030204" pitchFamily="34" charset="0"/>
                 <a:ea typeface="Montserrat"/>
-                <a:cs typeface="Montserrat"/>
+                <a:cs typeface="Calibri" panose="020F0502020204030204" pitchFamily="34" charset="0"/>
                 <a:sym typeface="Montserrat"/>
               </a:rPr>
               <a:t>Cost / benefit</a:t>
             </a:r>
             <a:r>
-              <a:rPr lang="en-GB"/>
+              <a:rPr lang="en-GB" dirty="0">
+                <a:solidFill>
+                  <a:srgbClr val="0070C0"/>
+                </a:solidFill>
+                <a:latin typeface="Calibri" panose="020F0502020204030204" pitchFamily="34" charset="0"/>
+                <a:cs typeface="Calibri" panose="020F0502020204030204" pitchFamily="34" charset="0"/>
+              </a:rPr>
               <a:t> analysis</a:t>
             </a:r>
-            <a:endParaRPr b="1">
-              <a:latin typeface="Montserrat"/>
+            <a:endParaRPr dirty="0">
+              <a:solidFill>
+                <a:srgbClr val="0070C0"/>
+              </a:solidFill>
+              <a:latin typeface="Calibri" panose="020F0502020204030204" pitchFamily="34" charset="0"/>
               <a:ea typeface="Montserrat"/>
-              <a:cs typeface="Montserrat"/>
+              <a:cs typeface="Calibri" panose="020F0502020204030204" pitchFamily="34" charset="0"/>
               <a:sym typeface="Montserrat"/>
             </a:endParaRPr>
           </a:p>
@@ -17766,11 +17902,11 @@
             <a:r>
               <a:rPr lang="en-GB" sz="1100">
                 <a:solidFill>
-                  <a:srgbClr val="1396AE"/>
+                  <a:srgbClr val="0070C0"/>
                 </a:solidFill>
-                <a:latin typeface="Montserrat Light"/>
+                <a:latin typeface="Calibri" panose="020F0502020204030204" pitchFamily="34" charset="0"/>
                 <a:ea typeface="Montserrat Light"/>
-                <a:cs typeface="Montserrat Light"/>
+                <a:cs typeface="Calibri" panose="020F0502020204030204" pitchFamily="34" charset="0"/>
                 <a:sym typeface="Montserrat Light"/>
               </a:rPr>
               <a:t>Our calculations show that building Pizza App will make you load of dosh</a:t>
@@ -17778,16 +17914,22 @@
             <a:r>
               <a:rPr lang="en-GB" sz="1400">
                 <a:solidFill>
-                  <a:srgbClr val="1396AE"/>
+                  <a:srgbClr val="0070C0"/>
                 </a:solidFill>
-                <a:latin typeface="Montserrat Light"/>
+                <a:latin typeface="Calibri" panose="020F0502020204030204" pitchFamily="34" charset="0"/>
                 <a:ea typeface="Montserrat Light"/>
-                <a:cs typeface="Montserrat Light"/>
+                <a:cs typeface="Calibri" panose="020F0502020204030204" pitchFamily="34" charset="0"/>
                 <a:sym typeface="Montserrat Light"/>
               </a:rPr>
               <a:t>!</a:t>
             </a:r>
-            <a:endParaRPr/>
+            <a:endParaRPr>
+              <a:solidFill>
+                <a:srgbClr val="0070C0"/>
+              </a:solidFill>
+              <a:latin typeface="Calibri" panose="020F0502020204030204" pitchFamily="34" charset="0"/>
+              <a:cs typeface="Calibri" panose="020F0502020204030204" pitchFamily="34" charset="0"/>
+            </a:endParaRPr>
           </a:p>
         </p:txBody>
       </p:sp>
@@ -17826,18 +17968,21 @@
               <a:buNone/>
             </a:pPr>
             <a:r>
-              <a:rPr lang="en-GB" sz="1400" b="1">
+              <a:rPr lang="en-GB" sz="1400" b="1" dirty="0">
                 <a:solidFill>
                   <a:schemeClr val="dk1"/>
                 </a:solidFill>
-                <a:latin typeface="Calibri"/>
+                <a:latin typeface="Calibri" panose="020F0502020204030204" pitchFamily="34" charset="0"/>
                 <a:ea typeface="Calibri"/>
-                <a:cs typeface="Calibri"/>
+                <a:cs typeface="Calibri" panose="020F0502020204030204" pitchFamily="34" charset="0"/>
                 <a:sym typeface="Calibri"/>
               </a:rPr>
               <a:t>With Integrating Invoice-</a:t>
             </a:r>
-            <a:endParaRPr/>
+            <a:endParaRPr dirty="0">
+              <a:latin typeface="Calibri" panose="020F0502020204030204" pitchFamily="34" charset="0"/>
+              <a:cs typeface="Calibri" panose="020F0502020204030204" pitchFamily="34" charset="0"/>
+            </a:endParaRPr>
           </a:p>
           <a:p>
             <a:pPr marL="0" marR="0" lvl="0" indent="0" algn="l" rtl="0">
@@ -17850,18 +17995,21 @@
               <a:buNone/>
             </a:pPr>
             <a:r>
-              <a:rPr lang="en-GB" sz="1400" b="1">
+              <a:rPr lang="en-GB" sz="1400" b="1" dirty="0">
                 <a:solidFill>
                   <a:schemeClr val="dk1"/>
                 </a:solidFill>
-                <a:latin typeface="Calibri"/>
+                <a:latin typeface="Calibri" panose="020F0502020204030204" pitchFamily="34" charset="0"/>
                 <a:ea typeface="Calibri"/>
-                <a:cs typeface="Calibri"/>
+                <a:cs typeface="Calibri" panose="020F0502020204030204" pitchFamily="34" charset="0"/>
                 <a:sym typeface="Calibri"/>
               </a:rPr>
               <a:t>Costs:</a:t>
             </a:r>
-            <a:endParaRPr/>
+            <a:endParaRPr dirty="0">
+              <a:latin typeface="Calibri" panose="020F0502020204030204" pitchFamily="34" charset="0"/>
+              <a:cs typeface="Calibri" panose="020F0502020204030204" pitchFamily="34" charset="0"/>
+            </a:endParaRPr>
           </a:p>
           <a:p>
             <a:pPr marL="285750" marR="0" lvl="0" indent="-285750" algn="l" rtl="0">
@@ -17879,18 +18027,21 @@
               <a:buChar char="-"/>
             </a:pPr>
             <a:r>
-              <a:rPr lang="en-GB" sz="1400">
+              <a:rPr lang="en-GB" sz="1400" dirty="0">
                 <a:solidFill>
                   <a:schemeClr val="dk1"/>
                 </a:solidFill>
-                <a:latin typeface="Calibri"/>
+                <a:latin typeface="Calibri" panose="020F0502020204030204" pitchFamily="34" charset="0"/>
                 <a:ea typeface="Calibri"/>
-                <a:cs typeface="Calibri"/>
+                <a:cs typeface="Calibri" panose="020F0502020204030204" pitchFamily="34" charset="0"/>
                 <a:sym typeface="Calibri"/>
               </a:rPr>
               <a:t>Website development: £75,000</a:t>
             </a:r>
-            <a:endParaRPr/>
+            <a:endParaRPr dirty="0">
+              <a:latin typeface="Calibri" panose="020F0502020204030204" pitchFamily="34" charset="0"/>
+              <a:cs typeface="Calibri" panose="020F0502020204030204" pitchFamily="34" charset="0"/>
+            </a:endParaRPr>
           </a:p>
           <a:p>
             <a:pPr marL="285750" marR="0" lvl="0" indent="-285750" algn="l" rtl="0">
@@ -17908,18 +18059,17 @@
               <a:buChar char="-"/>
             </a:pPr>
             <a:r>
-              <a:rPr lang="en-GB" sz="1400">
+              <a:rPr lang="en-GB" sz="1400" dirty="0">
                 <a:solidFill>
                   <a:schemeClr val="dk1"/>
                 </a:solidFill>
-                <a:latin typeface="Calibri"/>
+                <a:latin typeface="Calibri" panose="020F0502020204030204" pitchFamily="34" charset="0"/>
                 <a:ea typeface="Calibri"/>
-                <a:cs typeface="Calibri"/>
+                <a:cs typeface="Calibri" panose="020F0502020204030204" pitchFamily="34" charset="0"/>
                 <a:sym typeface="Calibri"/>
               </a:rPr>
               <a:t>Training: £2,500 - £7,500</a:t>
             </a:r>
-            <a:endParaRPr/>
           </a:p>
           <a:p>
             <a:pPr marL="285750" marR="0" lvl="0" indent="-285750" algn="l" rtl="0">
@@ -17937,42 +18087,17 @@
               <a:buChar char="-"/>
             </a:pPr>
             <a:r>
-              <a:rPr lang="en-GB" sz="1400">
+              <a:rPr lang="en-GB" sz="1400" dirty="0">
                 <a:solidFill>
                   <a:schemeClr val="dk1"/>
                 </a:solidFill>
-                <a:latin typeface="Calibri"/>
+                <a:latin typeface="Calibri" panose="020F0502020204030204" pitchFamily="34" charset="0"/>
                 <a:ea typeface="Calibri"/>
-                <a:cs typeface="Calibri"/>
+                <a:cs typeface="Calibri" panose="020F0502020204030204" pitchFamily="34" charset="0"/>
                 <a:sym typeface="Calibri"/>
               </a:rPr>
-              <a:t>Total: £77,500 - £82,500</a:t>
+              <a:t>Web hosting</a:t>
             </a:r>
-            <a:endParaRPr/>
-          </a:p>
-          <a:p>
-            <a:pPr marL="0" marR="0" lvl="0" indent="0" algn="l" rtl="0">
-              <a:spcBef>
-                <a:spcPts val="0"/>
-              </a:spcBef>
-              <a:spcAft>
-                <a:spcPts val="0"/>
-              </a:spcAft>
-              <a:buNone/>
-            </a:pPr>
-            <a:r>
-              <a:rPr lang="en-GB" sz="1400" b="1">
-                <a:solidFill>
-                  <a:schemeClr val="dk1"/>
-                </a:solidFill>
-                <a:latin typeface="Calibri"/>
-                <a:ea typeface="Calibri"/>
-                <a:cs typeface="Calibri"/>
-                <a:sym typeface="Calibri"/>
-              </a:rPr>
-              <a:t>Benefits:</a:t>
-            </a:r>
-            <a:endParaRPr/>
           </a:p>
           <a:p>
             <a:pPr marL="285750" marR="0" lvl="0" indent="-285750" algn="l" rtl="0">
@@ -17990,66 +18115,20 @@
               <a:buChar char="-"/>
             </a:pPr>
             <a:r>
-              <a:rPr lang="en-GB" sz="1400">
+              <a:rPr lang="en-GB" sz="1400" dirty="0">
                 <a:solidFill>
                   <a:schemeClr val="dk1"/>
                 </a:solidFill>
-                <a:latin typeface="Calibri"/>
-                <a:ea typeface="Calibri"/>
-                <a:cs typeface="Calibri"/>
+                <a:latin typeface="Calibri" panose="020F0502020204030204" pitchFamily="34" charset="0"/>
+                <a:cs typeface="Calibri" panose="020F0502020204030204" pitchFamily="34" charset="0"/>
                 <a:sym typeface="Calibri"/>
               </a:rPr>
-              <a:t>One less person answering the phone as the web application does it all automatically and takes orders etc.</a:t>
+              <a:t>Maintenance</a:t>
             </a:r>
-            <a:endParaRPr/>
-          </a:p>
-          <a:p>
-            <a:pPr marL="0" marR="0" lvl="0" indent="0" algn="l" rtl="0">
-              <a:spcBef>
-                <a:spcPts val="0"/>
-              </a:spcBef>
-              <a:spcAft>
-                <a:spcPts val="0"/>
-              </a:spcAft>
-              <a:buNone/>
-            </a:pPr>
-            <a:r>
-              <a:rPr lang="en-GB" sz="1400">
-                <a:solidFill>
-                  <a:schemeClr val="dk1"/>
-                </a:solidFill>
-                <a:latin typeface="Calibri"/>
-                <a:ea typeface="Calibri"/>
-                <a:cs typeface="Calibri"/>
-                <a:sym typeface="Calibri"/>
-              </a:rPr>
-              <a:t>8 hours a day @ £8.15 per hour 7 days a week</a:t>
-            </a:r>
-            <a:endParaRPr/>
-          </a:p>
-          <a:p>
-            <a:pPr marL="0" marR="0" lvl="0" indent="0" algn="l" rtl="0">
-              <a:spcBef>
-                <a:spcPts val="0"/>
-              </a:spcBef>
-              <a:spcAft>
-                <a:spcPts val="0"/>
-              </a:spcAft>
-              <a:buNone/>
-            </a:pPr>
-            <a:r>
-              <a:rPr lang="en-GB" sz="1400">
-                <a:solidFill>
-                  <a:schemeClr val="dk1"/>
-                </a:solidFill>
-                <a:latin typeface="Calibri"/>
-                <a:ea typeface="Calibri"/>
-                <a:cs typeface="Calibri"/>
-                <a:sym typeface="Calibri"/>
-              </a:rPr>
-              <a:t>Saves £1,825 a month, £21,907 a year.</a:t>
-            </a:r>
-            <a:endParaRPr/>
+            <a:endParaRPr dirty="0">
+              <a:latin typeface="Calibri" panose="020F0502020204030204" pitchFamily="34" charset="0"/>
+              <a:cs typeface="Calibri" panose="020F0502020204030204" pitchFamily="34" charset="0"/>
+            </a:endParaRPr>
           </a:p>
           <a:p>
             <a:pPr marL="285750" marR="0" lvl="0" indent="-285750" algn="l" rtl="0">
@@ -18067,18 +18146,21 @@
               <a:buChar char="-"/>
             </a:pPr>
             <a:r>
-              <a:rPr lang="en-GB" sz="1400">
+              <a:rPr lang="en-GB" sz="1400" dirty="0">
                 <a:solidFill>
                   <a:schemeClr val="dk1"/>
                 </a:solidFill>
-                <a:latin typeface="Calibri"/>
+                <a:latin typeface="Calibri" panose="020F0502020204030204" pitchFamily="34" charset="0"/>
                 <a:ea typeface="Calibri"/>
-                <a:cs typeface="Calibri"/>
+                <a:cs typeface="Calibri" panose="020F0502020204030204" pitchFamily="34" charset="0"/>
                 <a:sym typeface="Calibri"/>
               </a:rPr>
-              <a:t>One less person managing the invoices.</a:t>
+              <a:t>Total: £77,500 - £82,500</a:t>
             </a:r>
-            <a:endParaRPr/>
+            <a:endParaRPr dirty="0">
+              <a:latin typeface="Calibri" panose="020F0502020204030204" pitchFamily="34" charset="0"/>
+              <a:cs typeface="Calibri" panose="020F0502020204030204" pitchFamily="34" charset="0"/>
+            </a:endParaRPr>
           </a:p>
           <a:p>
             <a:pPr marL="0" marR="0" lvl="0" indent="0" algn="l" rtl="0">
@@ -18091,66 +18173,21 @@
               <a:buNone/>
             </a:pPr>
             <a:r>
-              <a:rPr lang="en-GB" sz="1400">
+              <a:rPr lang="en-GB" sz="1400" b="1" dirty="0">
                 <a:solidFill>
                   <a:schemeClr val="dk1"/>
                 </a:solidFill>
-                <a:latin typeface="Calibri"/>
+                <a:latin typeface="Calibri" panose="020F0502020204030204" pitchFamily="34" charset="0"/>
                 <a:ea typeface="Calibri"/>
-                <a:cs typeface="Calibri"/>
+                <a:cs typeface="Calibri" panose="020F0502020204030204" pitchFamily="34" charset="0"/>
                 <a:sym typeface="Calibri"/>
               </a:rPr>
-              <a:t>8 hours a day @ £12.15 per hour 5 days a week</a:t>
+              <a:t>Benefits:</a:t>
             </a:r>
-            <a:endParaRPr/>
-          </a:p>
-          <a:p>
-            <a:pPr marL="0" marR="0" lvl="0" indent="0" algn="l" rtl="0">
-              <a:spcBef>
-                <a:spcPts val="0"/>
-              </a:spcBef>
-              <a:spcAft>
-                <a:spcPts val="0"/>
-              </a:spcAft>
-              <a:buNone/>
-            </a:pPr>
-            <a:r>
-              <a:rPr lang="en-GB" sz="1400">
-                <a:solidFill>
-                  <a:schemeClr val="dk1"/>
-                </a:solidFill>
-                <a:latin typeface="Calibri"/>
-                <a:ea typeface="Calibri"/>
-                <a:cs typeface="Calibri"/>
-                <a:sym typeface="Calibri"/>
-              </a:rPr>
-              <a:t>Saves £1,944 a month, £23,328 a year.</a:t>
-            </a:r>
-            <a:endParaRPr/>
-          </a:p>
-          <a:p>
-            <a:pPr marL="0" marR="0" lvl="0" indent="0" algn="l" rtl="0">
-              <a:spcBef>
-                <a:spcPts val="0"/>
-              </a:spcBef>
-              <a:spcAft>
-                <a:spcPts val="0"/>
-              </a:spcAft>
-              <a:buNone/>
-            </a:pPr>
-            <a:r>
-              <a:rPr lang="en-GB" sz="1400" b="1">
-                <a:solidFill>
-                  <a:schemeClr val="dk1"/>
-                </a:solidFill>
-                <a:latin typeface="Calibri"/>
-                <a:ea typeface="Calibri"/>
-                <a:cs typeface="Calibri"/>
-                <a:sym typeface="Calibri"/>
-              </a:rPr>
-              <a:t>Changes:</a:t>
-            </a:r>
-            <a:endParaRPr/>
+            <a:endParaRPr dirty="0">
+              <a:latin typeface="Calibri" panose="020F0502020204030204" pitchFamily="34" charset="0"/>
+              <a:cs typeface="Calibri" panose="020F0502020204030204" pitchFamily="34" charset="0"/>
+            </a:endParaRPr>
           </a:p>
           <a:p>
             <a:pPr marL="285750" marR="0" lvl="0" indent="-285750" algn="l" rtl="0">
@@ -18168,18 +18205,75 @@
               <a:buChar char="-"/>
             </a:pPr>
             <a:r>
-              <a:rPr lang="en-GB" sz="1400">
+              <a:rPr lang="en-GB" sz="1400" dirty="0">
                 <a:solidFill>
                   <a:schemeClr val="dk1"/>
                 </a:solidFill>
-                <a:latin typeface="Calibri"/>
+                <a:latin typeface="Calibri" panose="020F0502020204030204" pitchFamily="34" charset="0"/>
                 <a:ea typeface="Calibri"/>
-                <a:cs typeface="Calibri"/>
+                <a:cs typeface="Calibri" panose="020F0502020204030204" pitchFamily="34" charset="0"/>
                 <a:sym typeface="Calibri"/>
               </a:rPr>
-              <a:t>Retrain someone to manage orders instead of take orders etc. </a:t>
+              <a:t>One less person answering the phone as the web application does it all automatically and takes orders etc.</a:t>
             </a:r>
-            <a:endParaRPr/>
+            <a:endParaRPr dirty="0">
+              <a:latin typeface="Calibri" panose="020F0502020204030204" pitchFamily="34" charset="0"/>
+              <a:cs typeface="Calibri" panose="020F0502020204030204" pitchFamily="34" charset="0"/>
+            </a:endParaRPr>
+          </a:p>
+          <a:p>
+            <a:pPr marL="0" marR="0" lvl="0" indent="0" algn="l" rtl="0">
+              <a:spcBef>
+                <a:spcPts val="0"/>
+              </a:spcBef>
+              <a:spcAft>
+                <a:spcPts val="0"/>
+              </a:spcAft>
+              <a:buNone/>
+            </a:pPr>
+            <a:r>
+              <a:rPr lang="en-GB" sz="1400" dirty="0">
+                <a:solidFill>
+                  <a:schemeClr val="dk1"/>
+                </a:solidFill>
+                <a:latin typeface="Calibri" panose="020F0502020204030204" pitchFamily="34" charset="0"/>
+                <a:ea typeface="Calibri"/>
+                <a:cs typeface="Calibri" panose="020F0502020204030204" pitchFamily="34" charset="0"/>
+                <a:sym typeface="Calibri"/>
+              </a:rPr>
+              <a:t>8 hours a day @ £8.15 per hour 7 days a week</a:t>
+            </a:r>
+            <a:endParaRPr dirty="0">
+              <a:latin typeface="Calibri" panose="020F0502020204030204" pitchFamily="34" charset="0"/>
+              <a:cs typeface="Calibri" panose="020F0502020204030204" pitchFamily="34" charset="0"/>
+            </a:endParaRPr>
+          </a:p>
+          <a:p>
+            <a:pPr marL="0" marR="0" lvl="0" indent="0" algn="l" rtl="0">
+              <a:spcBef>
+                <a:spcPts val="0"/>
+              </a:spcBef>
+              <a:spcAft>
+                <a:spcPts val="0"/>
+              </a:spcAft>
+              <a:buNone/>
+            </a:pPr>
+            <a:r>
+              <a:rPr lang="en-GB" sz="1400" dirty="0">
+                <a:solidFill>
+                  <a:schemeClr val="dk1"/>
+                </a:solidFill>
+                <a:latin typeface="Calibri" panose="020F0502020204030204" pitchFamily="34" charset="0"/>
+                <a:ea typeface="Calibri"/>
+                <a:cs typeface="Calibri" panose="020F0502020204030204" pitchFamily="34" charset="0"/>
+                <a:sym typeface="Calibri"/>
+              </a:rPr>
+              <a:t>Saves £1,825 a month, £21,907 a year.</a:t>
+            </a:r>
+            <a:endParaRPr dirty="0">
+              <a:latin typeface="Calibri" panose="020F0502020204030204" pitchFamily="34" charset="0"/>
+              <a:cs typeface="Calibri" panose="020F0502020204030204" pitchFamily="34" charset="0"/>
+            </a:endParaRPr>
           </a:p>
           <a:p>
             <a:pPr marL="285750" marR="0" lvl="0" indent="-285750" algn="l" rtl="0">
@@ -18197,18 +18291,21 @@
               <a:buChar char="-"/>
             </a:pPr>
             <a:r>
-              <a:rPr lang="en-GB" sz="1400">
+              <a:rPr lang="en-GB" sz="1400" dirty="0">
                 <a:solidFill>
                   <a:schemeClr val="dk1"/>
                 </a:solidFill>
-                <a:latin typeface="Calibri"/>
+                <a:latin typeface="Calibri" panose="020F0502020204030204" pitchFamily="34" charset="0"/>
                 <a:ea typeface="Calibri"/>
-                <a:cs typeface="Calibri"/>
+                <a:cs typeface="Calibri" panose="020F0502020204030204" pitchFamily="34" charset="0"/>
                 <a:sym typeface="Calibri"/>
               </a:rPr>
-              <a:t>Train for invoice integration</a:t>
+              <a:t>One less person managing the invoices.</a:t>
             </a:r>
-            <a:endParaRPr/>
+            <a:endParaRPr dirty="0">
+              <a:latin typeface="Calibri" panose="020F0502020204030204" pitchFamily="34" charset="0"/>
+              <a:cs typeface="Calibri" panose="020F0502020204030204" pitchFamily="34" charset="0"/>
+            </a:endParaRPr>
           </a:p>
           <a:p>
             <a:pPr marL="0" marR="0" lvl="0" indent="0" algn="l" rtl="0">
@@ -18221,18 +18318,75 @@
               <a:buNone/>
             </a:pPr>
             <a:r>
-              <a:rPr lang="en-GB" sz="1400">
+              <a:rPr lang="en-GB" sz="1400" dirty="0">
                 <a:solidFill>
                   <a:schemeClr val="dk1"/>
                 </a:solidFill>
-                <a:latin typeface="Calibri"/>
+                <a:latin typeface="Calibri" panose="020F0502020204030204" pitchFamily="34" charset="0"/>
                 <a:ea typeface="Calibri"/>
-                <a:cs typeface="Calibri"/>
+                <a:cs typeface="Calibri" panose="020F0502020204030204" pitchFamily="34" charset="0"/>
                 <a:sym typeface="Calibri"/>
               </a:rPr>
-              <a:t>App build:</a:t>
+              <a:t>8 hours a day @ £12.15 per hour 5 days a week</a:t>
             </a:r>
-            <a:endParaRPr/>
+            <a:endParaRPr dirty="0">
+              <a:latin typeface="Calibri" panose="020F0502020204030204" pitchFamily="34" charset="0"/>
+              <a:cs typeface="Calibri" panose="020F0502020204030204" pitchFamily="34" charset="0"/>
+            </a:endParaRPr>
+          </a:p>
+          <a:p>
+            <a:pPr marL="0" marR="0" lvl="0" indent="0" algn="l" rtl="0">
+              <a:spcBef>
+                <a:spcPts val="0"/>
+              </a:spcBef>
+              <a:spcAft>
+                <a:spcPts val="0"/>
+              </a:spcAft>
+              <a:buNone/>
+            </a:pPr>
+            <a:r>
+              <a:rPr lang="en-GB" sz="1400" dirty="0">
+                <a:solidFill>
+                  <a:schemeClr val="dk1"/>
+                </a:solidFill>
+                <a:latin typeface="Calibri" panose="020F0502020204030204" pitchFamily="34" charset="0"/>
+                <a:ea typeface="Calibri"/>
+                <a:cs typeface="Calibri" panose="020F0502020204030204" pitchFamily="34" charset="0"/>
+                <a:sym typeface="Calibri"/>
+              </a:rPr>
+              <a:t>Saves £1,944 a month, £23,328 a year.</a:t>
+            </a:r>
+            <a:endParaRPr dirty="0">
+              <a:latin typeface="Calibri" panose="020F0502020204030204" pitchFamily="34" charset="0"/>
+              <a:cs typeface="Calibri" panose="020F0502020204030204" pitchFamily="34" charset="0"/>
+            </a:endParaRPr>
+          </a:p>
+          <a:p>
+            <a:pPr marL="0" marR="0" lvl="0" indent="0" algn="l" rtl="0">
+              <a:spcBef>
+                <a:spcPts val="0"/>
+              </a:spcBef>
+              <a:spcAft>
+                <a:spcPts val="0"/>
+              </a:spcAft>
+              <a:buNone/>
+            </a:pPr>
+            <a:r>
+              <a:rPr lang="en-GB" sz="1400" b="1" dirty="0">
+                <a:solidFill>
+                  <a:schemeClr val="dk1"/>
+                </a:solidFill>
+                <a:latin typeface="Calibri" panose="020F0502020204030204" pitchFamily="34" charset="0"/>
+                <a:ea typeface="Calibri"/>
+                <a:cs typeface="Calibri" panose="020F0502020204030204" pitchFamily="34" charset="0"/>
+                <a:sym typeface="Calibri"/>
+              </a:rPr>
+              <a:t>Changes:</a:t>
+            </a:r>
+            <a:endParaRPr dirty="0">
+              <a:latin typeface="Calibri" panose="020F0502020204030204" pitchFamily="34" charset="0"/>
+              <a:cs typeface="Calibri" panose="020F0502020204030204" pitchFamily="34" charset="0"/>
+            </a:endParaRPr>
           </a:p>
           <a:p>
             <a:pPr marL="285750" marR="0" lvl="0" indent="-285750" algn="l" rtl="0">
@@ -18250,18 +18404,112 @@
               <a:buChar char="-"/>
             </a:pPr>
             <a:r>
-              <a:rPr lang="en-GB" sz="1400">
+              <a:rPr lang="en-GB" sz="1400" dirty="0">
                 <a:solidFill>
                   <a:schemeClr val="dk1"/>
                 </a:solidFill>
-                <a:latin typeface="Calibri"/>
+                <a:latin typeface="Calibri" panose="020F0502020204030204" pitchFamily="34" charset="0"/>
                 <a:ea typeface="Calibri"/>
-                <a:cs typeface="Calibri"/>
+                <a:cs typeface="Calibri" panose="020F0502020204030204" pitchFamily="34" charset="0"/>
+                <a:sym typeface="Calibri"/>
+              </a:rPr>
+              <a:t>Retrain someone to manage orders instead of take orders etc. </a:t>
+            </a:r>
+            <a:endParaRPr dirty="0">
+              <a:latin typeface="Calibri" panose="020F0502020204030204" pitchFamily="34" charset="0"/>
+              <a:cs typeface="Calibri" panose="020F0502020204030204" pitchFamily="34" charset="0"/>
+            </a:endParaRPr>
+          </a:p>
+          <a:p>
+            <a:pPr marL="285750" marR="0" lvl="0" indent="-285750" algn="l" rtl="0">
+              <a:spcBef>
+                <a:spcPts val="0"/>
+              </a:spcBef>
+              <a:spcAft>
+                <a:spcPts val="0"/>
+              </a:spcAft>
+              <a:buClr>
+                <a:schemeClr val="dk1"/>
+              </a:buClr>
+              <a:buSzPts val="1400"/>
+              <a:buFont typeface="Calibri"/>
+              <a:buChar char="-"/>
+            </a:pPr>
+            <a:r>
+              <a:rPr lang="en-GB" sz="1400" dirty="0">
+                <a:solidFill>
+                  <a:schemeClr val="dk1"/>
+                </a:solidFill>
+                <a:latin typeface="Calibri" panose="020F0502020204030204" pitchFamily="34" charset="0"/>
+                <a:ea typeface="Calibri"/>
+                <a:cs typeface="Calibri" panose="020F0502020204030204" pitchFamily="34" charset="0"/>
+                <a:sym typeface="Calibri"/>
+              </a:rPr>
+              <a:t>Train for invoice integration</a:t>
+            </a:r>
+            <a:endParaRPr dirty="0">
+              <a:latin typeface="Calibri" panose="020F0502020204030204" pitchFamily="34" charset="0"/>
+              <a:cs typeface="Calibri" panose="020F0502020204030204" pitchFamily="34" charset="0"/>
+            </a:endParaRPr>
+          </a:p>
+          <a:p>
+            <a:pPr marL="0" marR="0" lvl="0" indent="0" algn="l" rtl="0">
+              <a:spcBef>
+                <a:spcPts val="0"/>
+              </a:spcBef>
+              <a:spcAft>
+                <a:spcPts val="0"/>
+              </a:spcAft>
+              <a:buNone/>
+            </a:pPr>
+            <a:r>
+              <a:rPr lang="en-GB" sz="1400" dirty="0">
+                <a:solidFill>
+                  <a:schemeClr val="dk1"/>
+                </a:solidFill>
+                <a:latin typeface="Calibri" panose="020F0502020204030204" pitchFamily="34" charset="0"/>
+                <a:ea typeface="Calibri"/>
+                <a:cs typeface="Calibri" panose="020F0502020204030204" pitchFamily="34" charset="0"/>
+                <a:sym typeface="Calibri"/>
+              </a:rPr>
+              <a:t>App build:</a:t>
+            </a:r>
+            <a:endParaRPr dirty="0">
+              <a:latin typeface="Calibri" panose="020F0502020204030204" pitchFamily="34" charset="0"/>
+              <a:cs typeface="Calibri" panose="020F0502020204030204" pitchFamily="34" charset="0"/>
+            </a:endParaRPr>
+          </a:p>
+          <a:p>
+            <a:pPr marL="285750" marR="0" lvl="0" indent="-285750" algn="l" rtl="0">
+              <a:spcBef>
+                <a:spcPts val="0"/>
+              </a:spcBef>
+              <a:spcAft>
+                <a:spcPts val="0"/>
+              </a:spcAft>
+              <a:buClr>
+                <a:schemeClr val="dk1"/>
+              </a:buClr>
+              <a:buSzPts val="1400"/>
+              <a:buFont typeface="Calibri"/>
+              <a:buChar char="-"/>
+            </a:pPr>
+            <a:r>
+              <a:rPr lang="en-GB" sz="1400" dirty="0">
+                <a:solidFill>
+                  <a:schemeClr val="dk1"/>
+                </a:solidFill>
+                <a:latin typeface="Calibri" panose="020F0502020204030204" pitchFamily="34" charset="0"/>
+                <a:ea typeface="Calibri"/>
+                <a:cs typeface="Calibri" panose="020F0502020204030204" pitchFamily="34" charset="0"/>
                 <a:sym typeface="Calibri"/>
               </a:rPr>
               <a:t>3 to 4 months</a:t>
             </a:r>
-            <a:endParaRPr/>
+            <a:endParaRPr dirty="0">
+              <a:latin typeface="Calibri" panose="020F0502020204030204" pitchFamily="34" charset="0"/>
+              <a:cs typeface="Calibri" panose="020F0502020204030204" pitchFamily="34" charset="0"/>
+            </a:endParaRPr>
           </a:p>
           <a:p>
             <a:pPr marL="0" marR="0" lvl="0" indent="0" algn="l" rtl="0">
@@ -18274,18 +18522,21 @@
               <a:buNone/>
             </a:pPr>
             <a:r>
-              <a:rPr lang="en-GB" sz="1400">
+              <a:rPr lang="en-GB" sz="1400" dirty="0">
                 <a:solidFill>
                   <a:schemeClr val="dk1"/>
                 </a:solidFill>
-                <a:latin typeface="Calibri"/>
+                <a:latin typeface="Calibri" panose="020F0502020204030204" pitchFamily="34" charset="0"/>
                 <a:ea typeface="Calibri"/>
-                <a:cs typeface="Calibri"/>
+                <a:cs typeface="Calibri" panose="020F0502020204030204" pitchFamily="34" charset="0"/>
                 <a:sym typeface="Calibri"/>
               </a:rPr>
               <a:t>£82,500 cost/£45,235 benefit</a:t>
             </a:r>
-            <a:endParaRPr/>
+            <a:endParaRPr dirty="0">
+              <a:latin typeface="Calibri" panose="020F0502020204030204" pitchFamily="34" charset="0"/>
+              <a:cs typeface="Calibri" panose="020F0502020204030204" pitchFamily="34" charset="0"/>
+            </a:endParaRPr>
           </a:p>
           <a:p>
             <a:pPr marL="0" marR="0" lvl="0" indent="0" algn="l" rtl="0">
@@ -18298,18 +18549,33 @@
               <a:buNone/>
             </a:pPr>
             <a:r>
-              <a:rPr lang="en-GB" sz="1400">
+              <a:rPr lang="en-GB" sz="1400" dirty="0" err="1">
                 <a:solidFill>
                   <a:schemeClr val="dk1"/>
                 </a:solidFill>
-                <a:latin typeface="Calibri"/>
+                <a:latin typeface="Calibri" panose="020F0502020204030204" pitchFamily="34" charset="0"/>
                 <a:ea typeface="Calibri"/>
-                <a:cs typeface="Calibri"/>
+                <a:cs typeface="Calibri" panose="020F0502020204030204" pitchFamily="34" charset="0"/>
                 <a:sym typeface="Calibri"/>
               </a:rPr>
-              <a:t>Payed back with profit in 24 months. </a:t>
+              <a:t>Payed</a:t>
             </a:r>
-            <a:endParaRPr/>
+            <a:r>
+              <a:rPr lang="en-GB" sz="1400" dirty="0">
+                <a:solidFill>
+                  <a:schemeClr val="dk1"/>
+                </a:solidFill>
+                <a:latin typeface="Calibri" panose="020F0502020204030204" pitchFamily="34" charset="0"/>
+                <a:ea typeface="Calibri"/>
+                <a:cs typeface="Calibri" panose="020F0502020204030204" pitchFamily="34" charset="0"/>
+                <a:sym typeface="Calibri"/>
+              </a:rPr>
+              <a:t> back with profit in 24 months. </a:t>
+            </a:r>
+            <a:endParaRPr dirty="0">
+              <a:latin typeface="Calibri" panose="020F0502020204030204" pitchFamily="34" charset="0"/>
+              <a:cs typeface="Calibri" panose="020F0502020204030204" pitchFamily="34" charset="0"/>
+            </a:endParaRPr>
           </a:p>
         </p:txBody>
       </p:sp>
@@ -18384,10 +18650,16 @@
               <a:buNone/>
             </a:pPr>
             <a:r>
-              <a:rPr lang="en-GB" dirty="0"/>
+              <a:rPr lang="en-GB" dirty="0">
+                <a:latin typeface="Calibri Light" panose="020F0302020204030204" pitchFamily="34" charset="0"/>
+                <a:cs typeface="Calibri Light" panose="020F0302020204030204" pitchFamily="34" charset="0"/>
+              </a:rPr>
               <a:t>QUIZZING APP – BUSINESS CASE</a:t>
             </a:r>
-            <a:endParaRPr dirty="0"/>
+            <a:endParaRPr dirty="0">
+              <a:latin typeface="Calibri Light" panose="020F0302020204030204" pitchFamily="34" charset="0"/>
+              <a:cs typeface="Calibri Light" panose="020F0302020204030204" pitchFamily="34" charset="0"/>
+            </a:endParaRPr>
           </a:p>
         </p:txBody>
       </p:sp>
@@ -18437,22 +18709,34 @@
               <a:buNone/>
             </a:pPr>
             <a:r>
-              <a:rPr lang="en-GB" b="1" dirty="0">
-                <a:latin typeface="Montserrat"/>
+              <a:rPr lang="en-GB" dirty="0">
+                <a:solidFill>
+                  <a:srgbClr val="0070C0"/>
+                </a:solidFill>
+                <a:latin typeface="Calibri" panose="020F0502020204030204" pitchFamily="34" charset="0"/>
                 <a:ea typeface="Montserrat"/>
-                <a:cs typeface="Montserrat"/>
+                <a:cs typeface="Calibri" panose="020F0502020204030204" pitchFamily="34" charset="0"/>
                 <a:sym typeface="Montserrat"/>
               </a:rPr>
               <a:t>Risk</a:t>
             </a:r>
             <a:r>
-              <a:rPr lang="en-GB" dirty="0"/>
+              <a:rPr lang="en-GB" dirty="0">
+                <a:solidFill>
+                  <a:srgbClr val="0070C0"/>
+                </a:solidFill>
+                <a:latin typeface="Calibri" panose="020F0502020204030204" pitchFamily="34" charset="0"/>
+                <a:cs typeface="Calibri" panose="020F0502020204030204" pitchFamily="34" charset="0"/>
+              </a:rPr>
               <a:t> report</a:t>
             </a:r>
-            <a:endParaRPr b="1" dirty="0">
-              <a:latin typeface="Montserrat"/>
+            <a:endParaRPr dirty="0">
+              <a:solidFill>
+                <a:srgbClr val="0070C0"/>
+              </a:solidFill>
+              <a:latin typeface="Calibri" panose="020F0502020204030204" pitchFamily="34" charset="0"/>
               <a:ea typeface="Montserrat"/>
-              <a:cs typeface="Montserrat"/>
+              <a:cs typeface="Calibri" panose="020F0502020204030204" pitchFamily="34" charset="0"/>
               <a:sym typeface="Montserrat"/>
             </a:endParaRPr>
           </a:p>
@@ -18495,16 +18779,22 @@
             <a:r>
               <a:rPr lang="en-GB" sz="1400">
                 <a:solidFill>
-                  <a:srgbClr val="1396AE"/>
+                  <a:srgbClr val="0070C0"/>
                 </a:solidFill>
-                <a:latin typeface="Montserrat Light"/>
+                <a:latin typeface="Calibri" panose="020F0502020204030204" pitchFamily="34" charset="0"/>
                 <a:ea typeface="Montserrat Light"/>
-                <a:cs typeface="Montserrat Light"/>
+                <a:cs typeface="Calibri" panose="020F0502020204030204" pitchFamily="34" charset="0"/>
                 <a:sym typeface="Montserrat Light"/>
               </a:rPr>
               <a:t>These are the main risks with the Pizza App project</a:t>
             </a:r>
-            <a:endParaRPr/>
+            <a:endParaRPr>
+              <a:solidFill>
+                <a:srgbClr val="0070C0"/>
+              </a:solidFill>
+              <a:latin typeface="Calibri" panose="020F0502020204030204" pitchFamily="34" charset="0"/>
+              <a:cs typeface="Calibri" panose="020F0502020204030204" pitchFamily="34" charset="0"/>
+            </a:endParaRPr>
           </a:p>
         </p:txBody>
       </p:sp>
@@ -18515,7 +18805,7 @@
           <p:nvPr>
             <p:extLst>
               <p:ext uri="{D42A27DB-BD31-4B8C-83A1-F6EECF244321}">
-                <p14:modId xmlns:p14="http://schemas.microsoft.com/office/powerpoint/2010/main" val="4058264016"/>
+                <p14:modId xmlns:p14="http://schemas.microsoft.com/office/powerpoint/2010/main" val="3397463280"/>
               </p:ext>
             </p:extLst>
           </p:nvPr>
@@ -18585,19 +18875,22 @@
                       </a:pPr>
                       <a:r>
                         <a:rPr lang="en-GB" sz="1400" b="0" u="none" strike="noStrike" cap="none" dirty="0">
-                          <a:latin typeface="Montserrat"/>
+                          <a:latin typeface="Calibri Light" panose="020F0302020204030204" pitchFamily="34" charset="0"/>
                           <a:ea typeface="Montserrat"/>
-                          <a:cs typeface="Montserrat"/>
+                          <a:cs typeface="Calibri Light" panose="020F0302020204030204" pitchFamily="34" charset="0"/>
                           <a:sym typeface="Montserrat"/>
                         </a:rPr>
                         <a:t>Risk</a:t>
                       </a:r>
-                      <a:endParaRPr sz="1400" b="0" dirty="0"/>
+                      <a:endParaRPr sz="1400" b="0" dirty="0">
+                        <a:latin typeface="Calibri Light" panose="020F0302020204030204" pitchFamily="34" charset="0"/>
+                        <a:cs typeface="Calibri Light" panose="020F0302020204030204" pitchFamily="34" charset="0"/>
+                      </a:endParaRPr>
                     </a:p>
                   </a:txBody>
                   <a:tcPr marL="91450" marR="91450" marT="45725" marB="45725">
                     <a:solidFill>
-                      <a:srgbClr val="1396AE"/>
+                      <a:srgbClr val="0070C0"/>
                     </a:solidFill>
                   </a:tcPr>
                 </a:tc>
@@ -18616,20 +18909,23 @@
                         <a:buNone/>
                       </a:pPr>
                       <a:r>
-                        <a:rPr lang="en-GB" sz="1400" b="0">
-                          <a:latin typeface="Montserrat"/>
+                        <a:rPr lang="en-GB" sz="1400" b="0" dirty="0">
+                          <a:latin typeface="Calibri Light" panose="020F0302020204030204" pitchFamily="34" charset="0"/>
                           <a:ea typeface="Montserrat"/>
-                          <a:cs typeface="Montserrat"/>
+                          <a:cs typeface="Calibri Light" panose="020F0302020204030204" pitchFamily="34" charset="0"/>
                           <a:sym typeface="Montserrat"/>
                         </a:rPr>
                         <a:t>Likelihood</a:t>
                       </a:r>
-                      <a:endParaRPr sz="1400" b="0"/>
+                      <a:endParaRPr sz="1400" b="0" dirty="0">
+                        <a:latin typeface="Calibri Light" panose="020F0302020204030204" pitchFamily="34" charset="0"/>
+                        <a:cs typeface="Calibri Light" panose="020F0302020204030204" pitchFamily="34" charset="0"/>
+                      </a:endParaRPr>
                     </a:p>
                   </a:txBody>
                   <a:tcPr marL="91450" marR="91450" marT="45725" marB="45725">
                     <a:solidFill>
-                      <a:srgbClr val="1396AE"/>
+                      <a:srgbClr val="0070C0"/>
                     </a:solidFill>
                   </a:tcPr>
                 </a:tc>
@@ -18648,20 +18944,23 @@
                         <a:buNone/>
                       </a:pPr>
                       <a:r>
-                        <a:rPr lang="en-GB" sz="1400" b="0">
-                          <a:latin typeface="Montserrat"/>
+                        <a:rPr lang="en-GB" sz="1400" b="0" dirty="0">
+                          <a:latin typeface="Calibri Light" panose="020F0302020204030204" pitchFamily="34" charset="0"/>
                           <a:ea typeface="Montserrat"/>
-                          <a:cs typeface="Montserrat"/>
+                          <a:cs typeface="Calibri Light" panose="020F0302020204030204" pitchFamily="34" charset="0"/>
                           <a:sym typeface="Montserrat"/>
                         </a:rPr>
                         <a:t>Impact</a:t>
                       </a:r>
-                      <a:endParaRPr sz="1400" b="0"/>
+                      <a:endParaRPr sz="1400" b="0" dirty="0">
+                        <a:latin typeface="Calibri Light" panose="020F0302020204030204" pitchFamily="34" charset="0"/>
+                        <a:cs typeface="Calibri Light" panose="020F0302020204030204" pitchFamily="34" charset="0"/>
+                      </a:endParaRPr>
                     </a:p>
                   </a:txBody>
                   <a:tcPr marL="91450" marR="91450" marT="45725" marB="45725">
                     <a:solidFill>
-                      <a:srgbClr val="1396AE"/>
+                      <a:srgbClr val="0070C0"/>
                     </a:solidFill>
                   </a:tcPr>
                 </a:tc>
@@ -18680,20 +18979,23 @@
                         <a:buNone/>
                       </a:pPr>
                       <a:r>
-                        <a:rPr lang="en-GB" sz="1400" b="0">
-                          <a:latin typeface="Montserrat"/>
+                        <a:rPr lang="en-GB" sz="1400" b="0" dirty="0">
+                          <a:latin typeface="Calibri Light" panose="020F0302020204030204" pitchFamily="34" charset="0"/>
                           <a:ea typeface="Montserrat"/>
-                          <a:cs typeface="Montserrat"/>
+                          <a:cs typeface="Calibri Light" panose="020F0302020204030204" pitchFamily="34" charset="0"/>
                           <a:sym typeface="Montserrat"/>
                         </a:rPr>
                         <a:t>Severity</a:t>
                       </a:r>
-                      <a:endParaRPr sz="1400" b="0"/>
+                      <a:endParaRPr sz="1400" b="0" dirty="0">
+                        <a:latin typeface="Calibri Light" panose="020F0302020204030204" pitchFamily="34" charset="0"/>
+                        <a:cs typeface="Calibri Light" panose="020F0302020204030204" pitchFamily="34" charset="0"/>
+                      </a:endParaRPr>
                     </a:p>
                   </a:txBody>
                   <a:tcPr marL="91450" marR="91450" marT="45725" marB="45725">
                     <a:solidFill>
-                      <a:srgbClr val="1396AE"/>
+                      <a:srgbClr val="0070C0"/>
                     </a:solidFill>
                   </a:tcPr>
                 </a:tc>
@@ -18712,20 +19014,23 @@
                         <a:buNone/>
                       </a:pPr>
                       <a:r>
-                        <a:rPr lang="en-GB" sz="1400" b="0">
-                          <a:latin typeface="Montserrat"/>
+                        <a:rPr lang="en-GB" sz="1400" b="0" dirty="0">
+                          <a:latin typeface="Calibri Light" panose="020F0302020204030204" pitchFamily="34" charset="0"/>
                           <a:ea typeface="Montserrat"/>
-                          <a:cs typeface="Montserrat"/>
+                          <a:cs typeface="Calibri Light" panose="020F0302020204030204" pitchFamily="34" charset="0"/>
                           <a:sym typeface="Montserrat"/>
                         </a:rPr>
                         <a:t>Mitigation</a:t>
                       </a:r>
-                      <a:endParaRPr sz="1400" b="0"/>
+                      <a:endParaRPr sz="1400" b="0" dirty="0">
+                        <a:latin typeface="Calibri Light" panose="020F0302020204030204" pitchFamily="34" charset="0"/>
+                        <a:cs typeface="Calibri Light" panose="020F0302020204030204" pitchFamily="34" charset="0"/>
+                      </a:endParaRPr>
                     </a:p>
                   </a:txBody>
                   <a:tcPr marL="91450" marR="91450" marT="45725" marB="45725">
                     <a:solidFill>
-                      <a:srgbClr val="1396AE"/>
+                      <a:srgbClr val="0070C0"/>
                     </a:solidFill>
                   </a:tcPr>
                 </a:tc>
@@ -18752,14 +19057,17 @@
                       </a:pPr>
                       <a:r>
                         <a:rPr lang="en-GB" sz="1400" b="0" dirty="0">
-                          <a:latin typeface="Montserrat Light"/>
+                          <a:latin typeface="Calibri Light" panose="020F0302020204030204" pitchFamily="34" charset="0"/>
                           <a:ea typeface="Montserrat Light"/>
-                          <a:cs typeface="Montserrat Light"/>
+                          <a:cs typeface="Calibri Light" panose="020F0302020204030204" pitchFamily="34" charset="0"/>
                           <a:sym typeface="Montserrat Light"/>
                         </a:rPr>
                         <a:t>Integration with invoice is unsuccessful</a:t>
                       </a:r>
-                      <a:endParaRPr sz="1400" b="0" dirty="0"/>
+                      <a:endParaRPr sz="1400" b="0" dirty="0">
+                        <a:latin typeface="Calibri Light" panose="020F0302020204030204" pitchFamily="34" charset="0"/>
+                        <a:cs typeface="Calibri Light" panose="020F0302020204030204" pitchFamily="34" charset="0"/>
+                      </a:endParaRPr>
                     </a:p>
                   </a:txBody>
                   <a:tcPr marL="91450" marR="91450" marT="45725" marB="45725"/>
@@ -18780,14 +19088,17 @@
                       </a:pPr>
                       <a:r>
                         <a:rPr lang="en-GB" sz="1400" b="0">
-                          <a:latin typeface="Montserrat Light"/>
+                          <a:latin typeface="Calibri Light" panose="020F0302020204030204" pitchFamily="34" charset="0"/>
                           <a:ea typeface="Montserrat Light"/>
-                          <a:cs typeface="Montserrat Light"/>
+                          <a:cs typeface="Calibri Light" panose="020F0302020204030204" pitchFamily="34" charset="0"/>
                           <a:sym typeface="Montserrat Light"/>
                         </a:rPr>
                         <a:t>Medium</a:t>
                       </a:r>
-                      <a:endParaRPr sz="1400" b="0"/>
+                      <a:endParaRPr sz="1400" b="0">
+                        <a:latin typeface="Calibri Light" panose="020F0302020204030204" pitchFamily="34" charset="0"/>
+                        <a:cs typeface="Calibri Light" panose="020F0302020204030204" pitchFamily="34" charset="0"/>
+                      </a:endParaRPr>
                     </a:p>
                   </a:txBody>
                   <a:tcPr marL="91450" marR="91450" marT="45725" marB="45725"/>
@@ -18808,54 +19119,16 @@
                       </a:pPr>
                       <a:r>
                         <a:rPr lang="en-GB" sz="1400" b="0">
-                          <a:latin typeface="Montserrat Light"/>
+                          <a:latin typeface="Calibri Light" panose="020F0302020204030204" pitchFamily="34" charset="0"/>
                           <a:ea typeface="Montserrat Light"/>
-                          <a:cs typeface="Montserrat Light"/>
+                          <a:cs typeface="Calibri Light" panose="020F0302020204030204" pitchFamily="34" charset="0"/>
                           <a:sym typeface="Montserrat Light"/>
                         </a:rPr>
                         <a:t>Extra cost and possibly go over schedule</a:t>
                       </a:r>
-                      <a:endParaRPr sz="1400" b="0"/>
-                    </a:p>
-                  </a:txBody>
-                  <a:tcPr marL="91450" marR="91450" marT="45725" marB="45725"/>
-                </a:tc>
-                <a:tc>
-                  <a:txBody>
-                    <a:bodyPr/>
-                    <a:lstStyle/>
-                    <a:p>
-                      <a:pPr marL="0" marR="0" lvl="0" indent="0" algn="l" rtl="0">
-                        <a:spcBef>
-                          <a:spcPts val="0"/>
-                        </a:spcBef>
-                        <a:spcAft>
-                          <a:spcPts val="0"/>
-                        </a:spcAft>
-                        <a:buNone/>
-                      </a:pPr>
-                      <a:r>
-                        <a:rPr lang="en-GB" sz="1400" b="0">
-                          <a:solidFill>
-                            <a:schemeClr val="tx1">
-                              <a:lumMod val="75000"/>
-                              <a:lumOff val="25000"/>
-                            </a:schemeClr>
-                          </a:solidFill>
-                          <a:latin typeface="Montserrat Light"/>
-                          <a:ea typeface="Montserrat Light"/>
-                          <a:cs typeface="Montserrat Light"/>
-                          <a:sym typeface="Montserrat Light"/>
-                        </a:rPr>
-                        <a:t>High</a:t>
-                      </a:r>
                       <a:endParaRPr sz="1400" b="0">
-                        <a:solidFill>
-                          <a:schemeClr val="tx1">
-                            <a:lumMod val="75000"/>
-                            <a:lumOff val="25000"/>
-                          </a:schemeClr>
-                        </a:solidFill>
+                        <a:latin typeface="Calibri Light" panose="020F0302020204030204" pitchFamily="34" charset="0"/>
+                        <a:cs typeface="Calibri Light" panose="020F0302020204030204" pitchFamily="34" charset="0"/>
                       </a:endParaRPr>
                     </a:p>
                   </a:txBody>
@@ -18883,9 +19156,52 @@
                               <a:lumOff val="25000"/>
                             </a:schemeClr>
                           </a:solidFill>
-                          <a:latin typeface="Montserrat Light"/>
+                          <a:latin typeface="Calibri Light" panose="020F0302020204030204" pitchFamily="34" charset="0"/>
                           <a:ea typeface="Montserrat Light"/>
-                          <a:cs typeface="Montserrat Light"/>
+                          <a:cs typeface="Calibri Light" panose="020F0302020204030204" pitchFamily="34" charset="0"/>
+                          <a:sym typeface="Montserrat Light"/>
+                        </a:rPr>
+                        <a:t>High</a:t>
+                      </a:r>
+                      <a:endParaRPr sz="1400" b="0">
+                        <a:solidFill>
+                          <a:schemeClr val="tx1">
+                            <a:lumMod val="75000"/>
+                            <a:lumOff val="25000"/>
+                          </a:schemeClr>
+                        </a:solidFill>
+                        <a:latin typeface="Calibri Light" panose="020F0302020204030204" pitchFamily="34" charset="0"/>
+                        <a:cs typeface="Calibri Light" panose="020F0302020204030204" pitchFamily="34" charset="0"/>
+                      </a:endParaRPr>
+                    </a:p>
+                  </a:txBody>
+                  <a:tcPr marL="91450" marR="91450" marT="45725" marB="45725"/>
+                </a:tc>
+                <a:tc>
+                  <a:txBody>
+                    <a:bodyPr/>
+                    <a:lstStyle/>
+                    <a:p>
+                      <a:pPr marL="0" marR="0" lvl="0" indent="0" algn="l" rtl="0">
+                        <a:spcBef>
+                          <a:spcPts val="0"/>
+                        </a:spcBef>
+                        <a:spcAft>
+                          <a:spcPts val="0"/>
+                        </a:spcAft>
+                        <a:buNone/>
+                      </a:pPr>
+                      <a:r>
+                        <a:rPr lang="en-GB" sz="1400" b="0">
+                          <a:solidFill>
+                            <a:schemeClr val="tx1">
+                              <a:lumMod val="75000"/>
+                              <a:lumOff val="25000"/>
+                            </a:schemeClr>
+                          </a:solidFill>
+                          <a:latin typeface="Calibri Light" panose="020F0302020204030204" pitchFamily="34" charset="0"/>
+                          <a:ea typeface="Montserrat Light"/>
+                          <a:cs typeface="Calibri Light" panose="020F0302020204030204" pitchFamily="34" charset="0"/>
                           <a:sym typeface="Montserrat Light"/>
                         </a:rPr>
                         <a:t>Read up on the technical documentation.</a:t>
@@ -18897,6 +19213,8 @@
                             <a:lumOff val="25000"/>
                           </a:schemeClr>
                         </a:solidFill>
+                        <a:latin typeface="Calibri Light" panose="020F0302020204030204" pitchFamily="34" charset="0"/>
+                        <a:cs typeface="Calibri Light" panose="020F0302020204030204" pitchFamily="34" charset="0"/>
                       </a:endParaRPr>
                     </a:p>
                   </a:txBody>
@@ -18925,14 +19243,17 @@
                       </a:pPr>
                       <a:r>
                         <a:rPr lang="en-GB" sz="1400" b="0">
-                          <a:latin typeface="Montserrat Light"/>
+                          <a:latin typeface="Calibri Light" panose="020F0302020204030204" pitchFamily="34" charset="0"/>
                           <a:ea typeface="Montserrat Light"/>
-                          <a:cs typeface="Montserrat Light"/>
+                          <a:cs typeface="Calibri Light" panose="020F0302020204030204" pitchFamily="34" charset="0"/>
                           <a:sym typeface="Montserrat Light"/>
                         </a:rPr>
                         <a:t>Go over budget</a:t>
                       </a:r>
-                      <a:endParaRPr sz="1400" b="0"/>
+                      <a:endParaRPr sz="1400" b="0">
+                        <a:latin typeface="Calibri Light" panose="020F0302020204030204" pitchFamily="34" charset="0"/>
+                        <a:cs typeface="Calibri Light" panose="020F0302020204030204" pitchFamily="34" charset="0"/>
+                      </a:endParaRPr>
                     </a:p>
                   </a:txBody>
                   <a:tcPr marL="91450" marR="91450" marT="45725" marB="45725"/>
@@ -18953,14 +19274,17 @@
                       </a:pPr>
                       <a:r>
                         <a:rPr lang="en-GB" sz="1400" b="0">
-                          <a:latin typeface="Montserrat Light"/>
+                          <a:latin typeface="Calibri Light" panose="020F0302020204030204" pitchFamily="34" charset="0"/>
                           <a:ea typeface="Montserrat Light"/>
-                          <a:cs typeface="Montserrat Light"/>
+                          <a:cs typeface="Calibri Light" panose="020F0302020204030204" pitchFamily="34" charset="0"/>
                           <a:sym typeface="Montserrat Light"/>
                         </a:rPr>
                         <a:t>Low</a:t>
                       </a:r>
-                      <a:endParaRPr sz="1400" b="0"/>
+                      <a:endParaRPr sz="1400" b="0">
+                        <a:latin typeface="Calibri Light" panose="020F0302020204030204" pitchFamily="34" charset="0"/>
+                        <a:cs typeface="Calibri Light" panose="020F0302020204030204" pitchFamily="34" charset="0"/>
+                      </a:endParaRPr>
                     </a:p>
                   </a:txBody>
                   <a:tcPr marL="91450" marR="91450" marT="45725" marB="45725"/>
@@ -18981,14 +19305,17 @@
                       </a:pPr>
                       <a:r>
                         <a:rPr lang="en-GB" sz="1400" b="0">
-                          <a:latin typeface="Montserrat Light"/>
+                          <a:latin typeface="Calibri Light" panose="020F0302020204030204" pitchFamily="34" charset="0"/>
                           <a:ea typeface="Montserrat Light"/>
-                          <a:cs typeface="Montserrat Light"/>
+                          <a:cs typeface="Calibri Light" panose="020F0302020204030204" pitchFamily="34" charset="0"/>
                           <a:sym typeface="Montserrat Light"/>
                         </a:rPr>
                         <a:t>Customer is sad</a:t>
                       </a:r>
-                      <a:endParaRPr sz="1400" b="0"/>
+                      <a:endParaRPr sz="1400" b="0">
+                        <a:latin typeface="Calibri Light" panose="020F0302020204030204" pitchFamily="34" charset="0"/>
+                        <a:cs typeface="Calibri Light" panose="020F0302020204030204" pitchFamily="34" charset="0"/>
+                      </a:endParaRPr>
                     </a:p>
                   </a:txBody>
                   <a:tcPr marL="91450" marR="91450" marT="45725" marB="45725"/>
@@ -19015,9 +19342,9 @@
                               <a:lumOff val="25000"/>
                             </a:schemeClr>
                           </a:solidFill>
-                          <a:latin typeface="Montserrat Light"/>
+                          <a:latin typeface="Calibri Light" panose="020F0302020204030204" pitchFamily="34" charset="0"/>
                           <a:ea typeface="Montserrat Light"/>
-                          <a:cs typeface="Montserrat Light"/>
+                          <a:cs typeface="Calibri Light" panose="020F0302020204030204" pitchFamily="34" charset="0"/>
                           <a:sym typeface="Montserrat Light"/>
                         </a:rPr>
                         <a:t>Medium</a:t>
@@ -19029,6 +19356,8 @@
                             <a:lumOff val="25000"/>
                           </a:schemeClr>
                         </a:solidFill>
+                        <a:latin typeface="Calibri Light" panose="020F0302020204030204" pitchFamily="34" charset="0"/>
+                        <a:cs typeface="Calibri Light" panose="020F0302020204030204" pitchFamily="34" charset="0"/>
                       </a:endParaRPr>
                     </a:p>
                   </a:txBody>
@@ -19056,9 +19385,9 @@
                               <a:lumOff val="25000"/>
                             </a:schemeClr>
                           </a:solidFill>
-                          <a:latin typeface="Montserrat Light"/>
+                          <a:latin typeface="Calibri Light" panose="020F0302020204030204" pitchFamily="34" charset="0"/>
                           <a:ea typeface="Montserrat Light"/>
-                          <a:cs typeface="Montserrat Light"/>
+                          <a:cs typeface="Calibri Light" panose="020F0302020204030204" pitchFamily="34" charset="0"/>
                           <a:sym typeface="Montserrat Light"/>
                         </a:rPr>
                         <a:t>Deal with the customer in a respectful way.</a:t>
@@ -19070,6 +19399,8 @@
                             <a:lumOff val="25000"/>
                           </a:schemeClr>
                         </a:solidFill>
+                        <a:latin typeface="Calibri Light" panose="020F0302020204030204" pitchFamily="34" charset="0"/>
+                        <a:cs typeface="Calibri Light" panose="020F0302020204030204" pitchFamily="34" charset="0"/>
                       </a:endParaRPr>
                     </a:p>
                   </a:txBody>
@@ -19098,14 +19429,17 @@
                       </a:pPr>
                       <a:r>
                         <a:rPr lang="en-GB" sz="1400" b="0">
-                          <a:latin typeface="Montserrat Light"/>
+                          <a:latin typeface="Calibri Light" panose="020F0302020204030204" pitchFamily="34" charset="0"/>
                           <a:ea typeface="Montserrat Light"/>
-                          <a:cs typeface="Montserrat Light"/>
+                          <a:cs typeface="Calibri Light" panose="020F0302020204030204" pitchFamily="34" charset="0"/>
                           <a:sym typeface="Montserrat Light"/>
                         </a:rPr>
                         <a:t>Go over schedule</a:t>
                       </a:r>
-                      <a:endParaRPr sz="1400" b="0"/>
+                      <a:endParaRPr sz="1400" b="0">
+                        <a:latin typeface="Calibri Light" panose="020F0302020204030204" pitchFamily="34" charset="0"/>
+                        <a:cs typeface="Calibri Light" panose="020F0302020204030204" pitchFamily="34" charset="0"/>
+                      </a:endParaRPr>
                     </a:p>
                   </a:txBody>
                   <a:tcPr marL="91450" marR="91450" marT="45725" marB="45725"/>
@@ -19126,14 +19460,17 @@
                       </a:pPr>
                       <a:r>
                         <a:rPr lang="en-GB" sz="1400" b="0">
-                          <a:latin typeface="Montserrat Light"/>
+                          <a:latin typeface="Calibri Light" panose="020F0302020204030204" pitchFamily="34" charset="0"/>
                           <a:ea typeface="Montserrat Light"/>
-                          <a:cs typeface="Montserrat Light"/>
+                          <a:cs typeface="Calibri Light" panose="020F0302020204030204" pitchFamily="34" charset="0"/>
                           <a:sym typeface="Montserrat Light"/>
                         </a:rPr>
                         <a:t>Low</a:t>
                       </a:r>
-                      <a:endParaRPr sz="1400" b="0"/>
+                      <a:endParaRPr sz="1400" b="0">
+                        <a:latin typeface="Calibri Light" panose="020F0302020204030204" pitchFamily="34" charset="0"/>
+                        <a:cs typeface="Calibri Light" panose="020F0302020204030204" pitchFamily="34" charset="0"/>
+                      </a:endParaRPr>
                     </a:p>
                   </a:txBody>
                   <a:tcPr marL="91450" marR="91450" marT="45725" marB="45725"/>
@@ -19154,54 +19491,16 @@
                       </a:pPr>
                       <a:r>
                         <a:rPr lang="en-GB" sz="1400" b="0">
-                          <a:latin typeface="Montserrat Light"/>
+                          <a:latin typeface="Calibri Light" panose="020F0302020204030204" pitchFamily="34" charset="0"/>
                           <a:ea typeface="Montserrat Light"/>
-                          <a:cs typeface="Montserrat Light"/>
+                          <a:cs typeface="Calibri Light" panose="020F0302020204030204" pitchFamily="34" charset="0"/>
                           <a:sym typeface="Montserrat Light"/>
                         </a:rPr>
                         <a:t>Customer is sad</a:t>
                       </a:r>
-                      <a:endParaRPr sz="1400" b="0"/>
-                    </a:p>
-                  </a:txBody>
-                  <a:tcPr marL="91450" marR="91450" marT="45725" marB="45725"/>
-                </a:tc>
-                <a:tc>
-                  <a:txBody>
-                    <a:bodyPr/>
-                    <a:lstStyle/>
-                    <a:p>
-                      <a:pPr marL="0" marR="0" lvl="0" indent="0" algn="l" rtl="0">
-                        <a:spcBef>
-                          <a:spcPts val="0"/>
-                        </a:spcBef>
-                        <a:spcAft>
-                          <a:spcPts val="0"/>
-                        </a:spcAft>
-                        <a:buNone/>
-                      </a:pPr>
-                      <a:r>
-                        <a:rPr lang="en-GB" sz="1400" b="0" dirty="0">
-                          <a:solidFill>
-                            <a:schemeClr val="tx1">
-                              <a:lumMod val="75000"/>
-                              <a:lumOff val="25000"/>
-                            </a:schemeClr>
-                          </a:solidFill>
-                          <a:latin typeface="Montserrat Light"/>
-                          <a:ea typeface="Montserrat Light"/>
-                          <a:cs typeface="Montserrat Light"/>
-                          <a:sym typeface="Montserrat Light"/>
-                        </a:rPr>
-                        <a:t>Medium</a:t>
-                      </a:r>
-                      <a:endParaRPr sz="1400" b="0" dirty="0">
-                        <a:solidFill>
-                          <a:schemeClr val="tx1">
-                            <a:lumMod val="75000"/>
-                            <a:lumOff val="25000"/>
-                          </a:schemeClr>
-                        </a:solidFill>
+                      <a:endParaRPr sz="1400" b="0">
+                        <a:latin typeface="Calibri Light" panose="020F0302020204030204" pitchFamily="34" charset="0"/>
+                        <a:cs typeface="Calibri Light" panose="020F0302020204030204" pitchFamily="34" charset="0"/>
                       </a:endParaRPr>
                     </a:p>
                   </a:txBody>
@@ -19229,9 +19528,52 @@
                               <a:lumOff val="25000"/>
                             </a:schemeClr>
                           </a:solidFill>
-                          <a:latin typeface="Montserrat Light"/>
+                          <a:latin typeface="Calibri Light" panose="020F0302020204030204" pitchFamily="34" charset="0"/>
                           <a:ea typeface="Montserrat Light"/>
-                          <a:cs typeface="Montserrat Light"/>
+                          <a:cs typeface="Calibri Light" panose="020F0302020204030204" pitchFamily="34" charset="0"/>
+                          <a:sym typeface="Montserrat Light"/>
+                        </a:rPr>
+                        <a:t>Medium</a:t>
+                      </a:r>
+                      <a:endParaRPr sz="1400" b="0" dirty="0">
+                        <a:solidFill>
+                          <a:schemeClr val="tx1">
+                            <a:lumMod val="75000"/>
+                            <a:lumOff val="25000"/>
+                          </a:schemeClr>
+                        </a:solidFill>
+                        <a:latin typeface="Calibri Light" panose="020F0302020204030204" pitchFamily="34" charset="0"/>
+                        <a:cs typeface="Calibri Light" panose="020F0302020204030204" pitchFamily="34" charset="0"/>
+                      </a:endParaRPr>
+                    </a:p>
+                  </a:txBody>
+                  <a:tcPr marL="91450" marR="91450" marT="45725" marB="45725"/>
+                </a:tc>
+                <a:tc>
+                  <a:txBody>
+                    <a:bodyPr/>
+                    <a:lstStyle/>
+                    <a:p>
+                      <a:pPr marL="0" marR="0" lvl="0" indent="0" algn="l" rtl="0">
+                        <a:spcBef>
+                          <a:spcPts val="0"/>
+                        </a:spcBef>
+                        <a:spcAft>
+                          <a:spcPts val="0"/>
+                        </a:spcAft>
+                        <a:buNone/>
+                      </a:pPr>
+                      <a:r>
+                        <a:rPr lang="en-GB" sz="1400" b="0" dirty="0">
+                          <a:solidFill>
+                            <a:schemeClr val="tx1">
+                              <a:lumMod val="75000"/>
+                              <a:lumOff val="25000"/>
+                            </a:schemeClr>
+                          </a:solidFill>
+                          <a:latin typeface="Calibri Light" panose="020F0302020204030204" pitchFamily="34" charset="0"/>
+                          <a:ea typeface="Montserrat Light"/>
+                          <a:cs typeface="Calibri Light" panose="020F0302020204030204" pitchFamily="34" charset="0"/>
                           <a:sym typeface="Montserrat Light"/>
                         </a:rPr>
                         <a:t>Plan ahead and inform customer of any changes in schedule as soon as possible.</a:t>
@@ -19243,6 +19585,8 @@
                             <a:lumOff val="25000"/>
                           </a:schemeClr>
                         </a:solidFill>
+                        <a:latin typeface="Calibri Light" panose="020F0302020204030204" pitchFamily="34" charset="0"/>
+                        <a:cs typeface="Calibri Light" panose="020F0302020204030204" pitchFamily="34" charset="0"/>
                       </a:endParaRPr>
                     </a:p>
                   </a:txBody>
@@ -19271,14 +19615,17 @@
                       </a:pPr>
                       <a:r>
                         <a:rPr lang="en-GB" sz="1400" b="0" dirty="0">
-                          <a:latin typeface="Montserrat Light"/>
+                          <a:latin typeface="Calibri Light" panose="020F0302020204030204" pitchFamily="34" charset="0"/>
                           <a:ea typeface="Montserrat Light"/>
-                          <a:cs typeface="Montserrat Light"/>
+                          <a:cs typeface="Calibri Light" panose="020F0302020204030204" pitchFamily="34" charset="0"/>
                           <a:sym typeface="Montserrat Light"/>
                         </a:rPr>
                         <a:t>User data security</a:t>
                       </a:r>
-                      <a:endParaRPr sz="1400" b="0" dirty="0"/>
+                      <a:endParaRPr sz="1400" b="0" dirty="0">
+                        <a:latin typeface="Calibri Light" panose="020F0302020204030204" pitchFamily="34" charset="0"/>
+                        <a:cs typeface="Calibri Light" panose="020F0302020204030204" pitchFamily="34" charset="0"/>
+                      </a:endParaRPr>
                     </a:p>
                   </a:txBody>
                   <a:tcPr marL="91450" marR="91450" marT="45725" marB="45725"/>
@@ -19299,14 +19646,17 @@
                       </a:pPr>
                       <a:r>
                         <a:rPr lang="en-GB" sz="1400" b="0">
-                          <a:latin typeface="Montserrat Light"/>
+                          <a:latin typeface="Calibri Light" panose="020F0302020204030204" pitchFamily="34" charset="0"/>
                           <a:ea typeface="Montserrat Light"/>
-                          <a:cs typeface="Montserrat Light"/>
+                          <a:cs typeface="Calibri Light" panose="020F0302020204030204" pitchFamily="34" charset="0"/>
                           <a:sym typeface="Montserrat Light"/>
                         </a:rPr>
                         <a:t>Low</a:t>
                       </a:r>
-                      <a:endParaRPr sz="1400" b="0"/>
+                      <a:endParaRPr sz="1400" b="0">
+                        <a:latin typeface="Calibri Light" panose="020F0302020204030204" pitchFamily="34" charset="0"/>
+                        <a:cs typeface="Calibri Light" panose="020F0302020204030204" pitchFamily="34" charset="0"/>
+                      </a:endParaRPr>
                     </a:p>
                   </a:txBody>
                   <a:tcPr marL="91450" marR="91450" marT="45725" marB="45725"/>
@@ -19327,54 +19677,16 @@
                       </a:pPr>
                       <a:r>
                         <a:rPr lang="en-GB" sz="1400" b="0">
-                          <a:latin typeface="Montserrat Light"/>
+                          <a:latin typeface="Calibri Light" panose="020F0302020204030204" pitchFamily="34" charset="0"/>
                           <a:ea typeface="Montserrat Light"/>
-                          <a:cs typeface="Montserrat Light"/>
+                          <a:cs typeface="Calibri Light" panose="020F0302020204030204" pitchFamily="34" charset="0"/>
                           <a:sym typeface="Montserrat Light"/>
                         </a:rPr>
                         <a:t>Loss of clients details etc</a:t>
                       </a:r>
-                      <a:endParaRPr sz="1400" b="0"/>
-                    </a:p>
-                  </a:txBody>
-                  <a:tcPr marL="91450" marR="91450" marT="45725" marB="45725"/>
-                </a:tc>
-                <a:tc>
-                  <a:txBody>
-                    <a:bodyPr/>
-                    <a:lstStyle/>
-                    <a:p>
-                      <a:pPr marL="0" marR="0" lvl="0" indent="0" algn="l" rtl="0">
-                        <a:spcBef>
-                          <a:spcPts val="0"/>
-                        </a:spcBef>
-                        <a:spcAft>
-                          <a:spcPts val="0"/>
-                        </a:spcAft>
-                        <a:buNone/>
-                      </a:pPr>
-                      <a:r>
-                        <a:rPr lang="en-GB" sz="1400" b="0">
-                          <a:solidFill>
-                            <a:schemeClr val="tx1">
-                              <a:lumMod val="75000"/>
-                              <a:lumOff val="25000"/>
-                            </a:schemeClr>
-                          </a:solidFill>
-                          <a:latin typeface="Montserrat Light"/>
-                          <a:ea typeface="Montserrat Light"/>
-                          <a:cs typeface="Montserrat Light"/>
-                          <a:sym typeface="Montserrat Light"/>
-                        </a:rPr>
-                        <a:t>High</a:t>
-                      </a:r>
                       <a:endParaRPr sz="1400" b="0">
-                        <a:solidFill>
-                          <a:schemeClr val="tx1">
-                            <a:lumMod val="75000"/>
-                            <a:lumOff val="25000"/>
-                          </a:schemeClr>
-                        </a:solidFill>
+                        <a:latin typeface="Calibri Light" panose="020F0302020204030204" pitchFamily="34" charset="0"/>
+                        <a:cs typeface="Calibri Light" panose="020F0302020204030204" pitchFamily="34" charset="0"/>
                       </a:endParaRPr>
                     </a:p>
                   </a:txBody>
@@ -19402,9 +19714,52 @@
                               <a:lumOff val="25000"/>
                             </a:schemeClr>
                           </a:solidFill>
-                          <a:latin typeface="Montserrat Light"/>
+                          <a:latin typeface="Calibri Light" panose="020F0302020204030204" pitchFamily="34" charset="0"/>
                           <a:ea typeface="Montserrat Light"/>
-                          <a:cs typeface="Montserrat Light"/>
+                          <a:cs typeface="Calibri Light" panose="020F0302020204030204" pitchFamily="34" charset="0"/>
+                          <a:sym typeface="Montserrat Light"/>
+                        </a:rPr>
+                        <a:t>High</a:t>
+                      </a:r>
+                      <a:endParaRPr sz="1400" b="0">
+                        <a:solidFill>
+                          <a:schemeClr val="tx1">
+                            <a:lumMod val="75000"/>
+                            <a:lumOff val="25000"/>
+                          </a:schemeClr>
+                        </a:solidFill>
+                        <a:latin typeface="Calibri Light" panose="020F0302020204030204" pitchFamily="34" charset="0"/>
+                        <a:cs typeface="Calibri Light" panose="020F0302020204030204" pitchFamily="34" charset="0"/>
+                      </a:endParaRPr>
+                    </a:p>
+                  </a:txBody>
+                  <a:tcPr marL="91450" marR="91450" marT="45725" marB="45725"/>
+                </a:tc>
+                <a:tc>
+                  <a:txBody>
+                    <a:bodyPr/>
+                    <a:lstStyle/>
+                    <a:p>
+                      <a:pPr marL="0" marR="0" lvl="0" indent="0" algn="l" rtl="0">
+                        <a:spcBef>
+                          <a:spcPts val="0"/>
+                        </a:spcBef>
+                        <a:spcAft>
+                          <a:spcPts val="0"/>
+                        </a:spcAft>
+                        <a:buNone/>
+                      </a:pPr>
+                      <a:r>
+                        <a:rPr lang="en-GB" sz="1400" b="0">
+                          <a:solidFill>
+                            <a:schemeClr val="tx1">
+                              <a:lumMod val="75000"/>
+                              <a:lumOff val="25000"/>
+                            </a:schemeClr>
+                          </a:solidFill>
+                          <a:latin typeface="Calibri Light" panose="020F0302020204030204" pitchFamily="34" charset="0"/>
+                          <a:ea typeface="Montserrat Light"/>
+                          <a:cs typeface="Calibri Light" panose="020F0302020204030204" pitchFamily="34" charset="0"/>
                           <a:sym typeface="Montserrat Light"/>
                         </a:rPr>
                         <a:t>Add extra layers of security.</a:t>
@@ -19416,6 +19771,8 @@
                             <a:lumOff val="25000"/>
                           </a:schemeClr>
                         </a:solidFill>
+                        <a:latin typeface="Calibri Light" panose="020F0302020204030204" pitchFamily="34" charset="0"/>
+                        <a:cs typeface="Calibri Light" panose="020F0302020204030204" pitchFamily="34" charset="0"/>
                       </a:endParaRPr>
                     </a:p>
                   </a:txBody>
@@ -19444,14 +19801,17 @@
                       </a:pPr>
                       <a:r>
                         <a:rPr lang="en-GB" sz="1400" b="0" dirty="0">
-                          <a:latin typeface="Montserrat Light"/>
+                          <a:latin typeface="Calibri Light" panose="020F0302020204030204" pitchFamily="34" charset="0"/>
                           <a:ea typeface="Montserrat Light"/>
-                          <a:cs typeface="Montserrat Light"/>
+                          <a:cs typeface="Calibri Light" panose="020F0302020204030204" pitchFamily="34" charset="0"/>
                           <a:sym typeface="Montserrat Light"/>
                         </a:rPr>
                         <a:t>Overload server traffic</a:t>
                       </a:r>
-                      <a:endParaRPr sz="1400" b="0" dirty="0"/>
+                      <a:endParaRPr sz="1400" b="0" dirty="0">
+                        <a:latin typeface="Calibri Light" panose="020F0302020204030204" pitchFamily="34" charset="0"/>
+                        <a:cs typeface="Calibri Light" panose="020F0302020204030204" pitchFamily="34" charset="0"/>
+                      </a:endParaRPr>
                     </a:p>
                   </a:txBody>
                   <a:tcPr marL="91450" marR="91450" marT="45725" marB="45725"/>
@@ -19472,14 +19832,17 @@
                       </a:pPr>
                       <a:r>
                         <a:rPr lang="en-GB" sz="1400" b="0" dirty="0">
-                          <a:latin typeface="Montserrat Light"/>
+                          <a:latin typeface="Calibri Light" panose="020F0302020204030204" pitchFamily="34" charset="0"/>
                           <a:ea typeface="Montserrat Light"/>
-                          <a:cs typeface="Montserrat Light"/>
+                          <a:cs typeface="Calibri Light" panose="020F0302020204030204" pitchFamily="34" charset="0"/>
                           <a:sym typeface="Montserrat Light"/>
                         </a:rPr>
                         <a:t>Medium</a:t>
                       </a:r>
-                      <a:endParaRPr sz="1400" b="0" dirty="0"/>
+                      <a:endParaRPr sz="1400" b="0" dirty="0">
+                        <a:latin typeface="Calibri Light" panose="020F0302020204030204" pitchFamily="34" charset="0"/>
+                        <a:cs typeface="Calibri Light" panose="020F0302020204030204" pitchFamily="34" charset="0"/>
+                      </a:endParaRPr>
                     </a:p>
                   </a:txBody>
                   <a:tcPr marL="91450" marR="91450" marT="45725" marB="45725"/>
@@ -19500,9 +19863,9 @@
                       </a:pPr>
                       <a:r>
                         <a:rPr lang="en-GB" sz="1400" b="0" dirty="0">
-                          <a:latin typeface="Montserrat Light"/>
+                          <a:latin typeface="Calibri Light" panose="020F0302020204030204" pitchFamily="34" charset="0"/>
                           <a:ea typeface="Montserrat Light"/>
-                          <a:cs typeface="Montserrat Light"/>
+                          <a:cs typeface="Calibri Light" panose="020F0302020204030204" pitchFamily="34" charset="0"/>
                           <a:sym typeface="Montserrat Light"/>
                         </a:rPr>
                         <a:t>Loss of </a:t>
@@ -19515,9 +19878,9 @@
                           <a:highlight>
                             <a:srgbClr val="000000"/>
                           </a:highlight>
-                          <a:latin typeface="Montserrat Light"/>
+                          <a:latin typeface="Calibri Light" panose="020F0302020204030204" pitchFamily="34" charset="0"/>
                           <a:ea typeface="Montserrat Light"/>
-                          <a:cs typeface="Montserrat Light"/>
+                          <a:cs typeface="Calibri Light" panose="020F0302020204030204" pitchFamily="34" charset="0"/>
                           <a:sym typeface="Montserrat Light"/>
                         </a:rPr>
                         <a:t>pi</a:t>
@@ -19530,9 +19893,9 @@
                           <a:highlight>
                             <a:srgbClr val="000000"/>
                           </a:highlight>
-                          <a:latin typeface="Montserrat Light"/>
+                          <a:latin typeface="Calibri Light" panose="020F0302020204030204" pitchFamily="34" charset="0"/>
                           <a:ea typeface="Montserrat Light"/>
-                          <a:cs typeface="Montserrat Light"/>
+                          <a:cs typeface="Calibri Light" panose="020F0302020204030204" pitchFamily="34" charset="0"/>
                           <a:sym typeface="Montserrat Light"/>
                         </a:rPr>
                         <a:t>zz</a:t>
@@ -19545,9 +19908,9 @@
                           <a:highlight>
                             <a:srgbClr val="000000"/>
                           </a:highlight>
-                          <a:latin typeface="Montserrat Light"/>
+                          <a:latin typeface="Calibri Light" panose="020F0302020204030204" pitchFamily="34" charset="0"/>
                           <a:ea typeface="Montserrat Light"/>
-                          <a:cs typeface="Montserrat Light"/>
+                          <a:cs typeface="Calibri Light" panose="020F0302020204030204" pitchFamily="34" charset="0"/>
                           <a:sym typeface="Montserrat Light"/>
                         </a:rPr>
                         <a:t>as</a:t>
@@ -19559,9 +19922,9 @@
                         <a:highlight>
                           <a:srgbClr val="000000"/>
                         </a:highlight>
-                        <a:latin typeface="Montserrat Light"/>
+                        <a:latin typeface="Calibri Light" panose="020F0302020204030204" pitchFamily="34" charset="0"/>
                         <a:ea typeface="Montserrat Light"/>
-                        <a:cs typeface="Montserrat Light"/>
+                        <a:cs typeface="Calibri Light" panose="020F0302020204030204" pitchFamily="34" charset="0"/>
                         <a:sym typeface="Montserrat Light"/>
                       </a:endParaRPr>
                     </a:p>
@@ -19590,9 +19953,9 @@
                               <a:lumOff val="25000"/>
                             </a:schemeClr>
                           </a:solidFill>
-                          <a:latin typeface="Montserrat Light"/>
+                          <a:latin typeface="Calibri Light" panose="020F0302020204030204" pitchFamily="34" charset="0"/>
                           <a:ea typeface="Montserrat Light"/>
-                          <a:cs typeface="Montserrat Light"/>
+                          <a:cs typeface="Calibri Light" panose="020F0302020204030204" pitchFamily="34" charset="0"/>
                           <a:sym typeface="Montserrat Light"/>
                         </a:rPr>
                         <a:t>Extreme</a:t>
@@ -19604,6 +19967,8 @@
                             <a:lumOff val="25000"/>
                           </a:schemeClr>
                         </a:solidFill>
+                        <a:latin typeface="Calibri Light" panose="020F0302020204030204" pitchFamily="34" charset="0"/>
+                        <a:cs typeface="Calibri Light" panose="020F0302020204030204" pitchFamily="34" charset="0"/>
                       </a:endParaRPr>
                     </a:p>
                   </a:txBody>
@@ -19631,9 +19996,9 @@
                               <a:lumOff val="25000"/>
                             </a:schemeClr>
                           </a:solidFill>
-                          <a:latin typeface="Montserrat Light"/>
+                          <a:latin typeface="Calibri Light" panose="020F0302020204030204" pitchFamily="34" charset="0"/>
                           <a:ea typeface="Montserrat Light"/>
-                          <a:cs typeface="Montserrat Light"/>
+                          <a:cs typeface="Calibri Light" panose="020F0302020204030204" pitchFamily="34" charset="0"/>
                           <a:sym typeface="Montserrat Light"/>
                         </a:rPr>
                         <a:t>don't overload the ovens.</a:t>
@@ -19645,6 +20010,8 @@
                             <a:lumOff val="25000"/>
                           </a:schemeClr>
                         </a:solidFill>
+                        <a:latin typeface="Calibri Light" panose="020F0302020204030204" pitchFamily="34" charset="0"/>
+                        <a:cs typeface="Calibri Light" panose="020F0302020204030204" pitchFamily="34" charset="0"/>
                       </a:endParaRPr>
                     </a:p>
                   </a:txBody>
@@ -19696,6 +20063,10 @@
           </p:nvPr>
         </p:nvSpPr>
         <p:spPr>
+          <a:xfrm>
+            <a:off x="534333" y="313321"/>
+            <a:ext cx="8567889" cy="171239"/>
+          </a:xfrm>
           <a:prstGeom prst="rect">
             <a:avLst/>
           </a:prstGeom>
@@ -19727,10 +20098,16 @@
               <a:buNone/>
             </a:pPr>
             <a:r>
-              <a:rPr lang="en-GB"/>
-              <a:t>PIZZA APP – BUSINESS CASE</a:t>
+              <a:rPr lang="en-GB" dirty="0">
+                <a:latin typeface="Calibri Light" panose="020F0302020204030204" pitchFamily="34" charset="0"/>
+                <a:cs typeface="Calibri Light" panose="020F0302020204030204" pitchFamily="34" charset="0"/>
+              </a:rPr>
+              <a:t>QUIZZING APP – BUSINESS CASE</a:t>
             </a:r>
-            <a:endParaRPr/>
+            <a:endParaRPr dirty="0">
+              <a:latin typeface="Calibri Light" panose="020F0302020204030204" pitchFamily="34" charset="0"/>
+              <a:cs typeface="Calibri Light" panose="020F0302020204030204" pitchFamily="34" charset="0"/>
+            </a:endParaRPr>
           </a:p>
         </p:txBody>
       </p:sp>
@@ -19780,22 +20157,34 @@
               <a:buNone/>
             </a:pPr>
             <a:r>
-              <a:rPr lang="en-GB" b="1" dirty="0">
-                <a:latin typeface="Montserrat"/>
+              <a:rPr lang="en-GB" dirty="0">
+                <a:solidFill>
+                  <a:srgbClr val="0070C0"/>
+                </a:solidFill>
+                <a:latin typeface="Calibri" panose="020F0502020204030204" pitchFamily="34" charset="0"/>
                 <a:ea typeface="Montserrat"/>
-                <a:cs typeface="Montserrat"/>
+                <a:cs typeface="Calibri" panose="020F0502020204030204" pitchFamily="34" charset="0"/>
                 <a:sym typeface="Montserrat"/>
               </a:rPr>
               <a:t>Requirements</a:t>
             </a:r>
             <a:r>
-              <a:rPr lang="en-GB" dirty="0"/>
+              <a:rPr lang="en-GB" dirty="0">
+                <a:solidFill>
+                  <a:srgbClr val="0070C0"/>
+                </a:solidFill>
+                <a:latin typeface="Calibri" panose="020F0502020204030204" pitchFamily="34" charset="0"/>
+                <a:cs typeface="Calibri" panose="020F0502020204030204" pitchFamily="34" charset="0"/>
+              </a:rPr>
               <a:t> analysis</a:t>
             </a:r>
-            <a:endParaRPr b="1" dirty="0">
-              <a:latin typeface="Montserrat"/>
+            <a:endParaRPr dirty="0">
+              <a:solidFill>
+                <a:srgbClr val="0070C0"/>
+              </a:solidFill>
+              <a:latin typeface="Calibri" panose="020F0502020204030204" pitchFamily="34" charset="0"/>
               <a:ea typeface="Montserrat"/>
-              <a:cs typeface="Montserrat"/>
+              <a:cs typeface="Calibri" panose="020F0502020204030204" pitchFamily="34" charset="0"/>
               <a:sym typeface="Montserrat"/>
             </a:endParaRPr>
           </a:p>
@@ -19838,11 +20227,11 @@
             <a:r>
               <a:rPr lang="en-GB" sz="1400">
                 <a:solidFill>
-                  <a:srgbClr val="1396AE"/>
+                  <a:srgbClr val="0070C0"/>
                 </a:solidFill>
-                <a:latin typeface="Montserrat Light"/>
+                <a:latin typeface="Calibri" panose="020F0502020204030204" pitchFamily="34" charset="0"/>
                 <a:ea typeface="Montserrat Light"/>
-                <a:cs typeface="Montserrat Light"/>
+                <a:cs typeface="Calibri" panose="020F0502020204030204" pitchFamily="34" charset="0"/>
                 <a:sym typeface="Montserrat Light"/>
               </a:rPr>
               <a:t>These are the </a:t>
@@ -19850,11 +20239,11 @@
             <a:r>
               <a:rPr lang="en-GB">
                 <a:solidFill>
-                  <a:srgbClr val="1396AE"/>
+                  <a:srgbClr val="0070C0"/>
                 </a:solidFill>
-                <a:latin typeface="Montserrat Light"/>
+                <a:latin typeface="Calibri" panose="020F0502020204030204" pitchFamily="34" charset="0"/>
                 <a:ea typeface="Montserrat Light"/>
-                <a:cs typeface="Montserrat Light"/>
+                <a:cs typeface="Calibri" panose="020F0502020204030204" pitchFamily="34" charset="0"/>
                 <a:sym typeface="Montserrat Light"/>
               </a:rPr>
               <a:t>Requirements</a:t>
@@ -19862,11 +20251,11 @@
             <a:r>
               <a:rPr lang="en-GB" sz="1400">
                 <a:solidFill>
-                  <a:srgbClr val="1396AE"/>
+                  <a:srgbClr val="0070C0"/>
                 </a:solidFill>
-                <a:latin typeface="Montserrat Light"/>
+                <a:latin typeface="Calibri" panose="020F0502020204030204" pitchFamily="34" charset="0"/>
                 <a:ea typeface="Montserrat Light"/>
-                <a:cs typeface="Montserrat Light"/>
+                <a:cs typeface="Calibri" panose="020F0502020204030204" pitchFamily="34" charset="0"/>
                 <a:sym typeface="Montserrat Light"/>
               </a:rPr>
               <a:t> with the Pizza App project (</a:t>
@@ -19874,16 +20263,22 @@
             <a:r>
               <a:rPr lang="en-GB">
                 <a:solidFill>
-                  <a:srgbClr val="1396AE"/>
+                  <a:srgbClr val="0070C0"/>
                 </a:solidFill>
-                <a:latin typeface="Montserrat Light"/>
+                <a:latin typeface="Calibri" panose="020F0502020204030204" pitchFamily="34" charset="0"/>
                 <a:ea typeface="Montserrat Light"/>
-                <a:cs typeface="Montserrat Light"/>
+                <a:cs typeface="Calibri" panose="020F0502020204030204" pitchFamily="34" charset="0"/>
                 <a:sym typeface="Montserrat Light"/>
               </a:rPr>
               <a:t>Minimum Viable Product and Nice to have Features.</a:t>
             </a:r>
-            <a:endParaRPr/>
+            <a:endParaRPr>
+              <a:solidFill>
+                <a:srgbClr val="0070C0"/>
+              </a:solidFill>
+              <a:latin typeface="Calibri" panose="020F0502020204030204" pitchFamily="34" charset="0"/>
+              <a:cs typeface="Calibri" panose="020F0502020204030204" pitchFamily="34" charset="0"/>
+            </a:endParaRPr>
           </a:p>
         </p:txBody>
       </p:sp>
@@ -19894,14 +20289,14 @@
           <p:nvPr>
             <p:extLst>
               <p:ext uri="{D42A27DB-BD31-4B8C-83A1-F6EECF244321}">
-                <p14:modId xmlns:p14="http://schemas.microsoft.com/office/powerpoint/2010/main" val="3319014932"/>
+                <p14:modId xmlns:p14="http://schemas.microsoft.com/office/powerpoint/2010/main" val="3108970404"/>
               </p:ext>
             </p:extLst>
           </p:nvPr>
         </p:nvGraphicFramePr>
         <p:xfrm>
           <a:off x="595481" y="1644222"/>
-          <a:ext cx="9965550" cy="4979015"/>
+          <a:ext cx="9965550" cy="4709775"/>
         </p:xfrm>
         <a:graphic>
           <a:graphicData uri="http://schemas.openxmlformats.org/drawingml/2006/table">
@@ -19957,19 +20352,22 @@
                       </a:pPr>
                       <a:r>
                         <a:rPr lang="en-GB" sz="1400" dirty="0">
-                          <a:latin typeface="Montserrat"/>
+                          <a:latin typeface="Calibri Light" panose="020F0302020204030204" pitchFamily="34" charset="0"/>
                           <a:ea typeface="Montserrat"/>
-                          <a:cs typeface="Montserrat"/>
+                          <a:cs typeface="Calibri Light" panose="020F0302020204030204" pitchFamily="34" charset="0"/>
                           <a:sym typeface="Montserrat"/>
                         </a:rPr>
                         <a:t>Requirements</a:t>
                       </a:r>
-                      <a:endParaRPr dirty="0"/>
+                      <a:endParaRPr dirty="0">
+                        <a:latin typeface="Calibri Light" panose="020F0302020204030204" pitchFamily="34" charset="0"/>
+                        <a:cs typeface="Calibri Light" panose="020F0302020204030204" pitchFamily="34" charset="0"/>
+                      </a:endParaRPr>
                     </a:p>
                   </a:txBody>
                   <a:tcPr marL="91450" marR="91450" marT="45725" marB="45725">
                     <a:solidFill>
-                      <a:srgbClr val="1396AE"/>
+                      <a:srgbClr val="0070C0"/>
                     </a:solidFill>
                   </a:tcPr>
                 </a:tc>
@@ -19988,25 +20386,25 @@
                         <a:buNone/>
                       </a:pPr>
                       <a:r>
-                        <a:rPr lang="en-GB" sz="1400">
-                          <a:latin typeface="Montserrat"/>
+                        <a:rPr lang="en-GB" sz="1400" dirty="0" err="1">
+                          <a:latin typeface="Calibri Light" panose="020F0302020204030204" pitchFamily="34" charset="0"/>
                           <a:ea typeface="Montserrat"/>
-                          <a:cs typeface="Montserrat"/>
+                          <a:cs typeface="Calibri Light" panose="020F0302020204030204" pitchFamily="34" charset="0"/>
                           <a:sym typeface="Montserrat"/>
                         </a:rPr>
                         <a:t>Importancy</a:t>
                       </a:r>
-                      <a:endParaRPr sz="1400">
-                        <a:latin typeface="Montserrat"/>
+                      <a:endParaRPr sz="1400" dirty="0">
+                        <a:latin typeface="Calibri Light" panose="020F0302020204030204" pitchFamily="34" charset="0"/>
                         <a:ea typeface="Montserrat"/>
-                        <a:cs typeface="Montserrat"/>
+                        <a:cs typeface="Calibri Light" panose="020F0302020204030204" pitchFamily="34" charset="0"/>
                         <a:sym typeface="Montserrat"/>
                       </a:endParaRPr>
                     </a:p>
                   </a:txBody>
                   <a:tcPr marL="91450" marR="91450" marT="45725" marB="45725">
                     <a:solidFill>
-                      <a:srgbClr val="1396AE"/>
+                      <a:srgbClr val="0070C0"/>
                     </a:solidFill>
                   </a:tcPr>
                 </a:tc>
@@ -20025,20 +20423,23 @@
                         <a:buNone/>
                       </a:pPr>
                       <a:r>
-                        <a:rPr lang="en-GB">
-                          <a:latin typeface="Montserrat"/>
+                        <a:rPr lang="en-GB" dirty="0">
+                          <a:latin typeface="Calibri Light" panose="020F0302020204030204" pitchFamily="34" charset="0"/>
                           <a:ea typeface="Montserrat"/>
-                          <a:cs typeface="Montserrat"/>
+                          <a:cs typeface="Calibri Light" panose="020F0302020204030204" pitchFamily="34" charset="0"/>
                           <a:sym typeface="Montserrat"/>
                         </a:rPr>
                         <a:t>Complex or not</a:t>
                       </a:r>
-                      <a:endParaRPr/>
+                      <a:endParaRPr dirty="0">
+                        <a:latin typeface="Calibri Light" panose="020F0302020204030204" pitchFamily="34" charset="0"/>
+                        <a:cs typeface="Calibri Light" panose="020F0302020204030204" pitchFamily="34" charset="0"/>
+                      </a:endParaRPr>
                     </a:p>
                   </a:txBody>
                   <a:tcPr marL="91450" marR="91450" marT="45725" marB="45725">
                     <a:solidFill>
-                      <a:srgbClr val="1396AE"/>
+                      <a:srgbClr val="0070C0"/>
                     </a:solidFill>
                   </a:tcPr>
                 </a:tc>
@@ -20057,25 +20458,25 @@
                         <a:buNone/>
                       </a:pPr>
                       <a:r>
-                        <a:rPr lang="en-GB">
-                          <a:latin typeface="Montserrat"/>
+                        <a:rPr lang="en-GB" dirty="0">
+                          <a:latin typeface="Calibri Light" panose="020F0302020204030204" pitchFamily="34" charset="0"/>
                           <a:ea typeface="Montserrat"/>
-                          <a:cs typeface="Montserrat"/>
+                          <a:cs typeface="Calibri Light" panose="020F0302020204030204" pitchFamily="34" charset="0"/>
                           <a:sym typeface="Montserrat"/>
                         </a:rPr>
                         <a:t>Functional or not</a:t>
                       </a:r>
-                      <a:endParaRPr>
-                        <a:latin typeface="Montserrat"/>
+                      <a:endParaRPr dirty="0">
+                        <a:latin typeface="Calibri Light" panose="020F0302020204030204" pitchFamily="34" charset="0"/>
                         <a:ea typeface="Montserrat"/>
-                        <a:cs typeface="Montserrat"/>
+                        <a:cs typeface="Calibri Light" panose="020F0302020204030204" pitchFamily="34" charset="0"/>
                         <a:sym typeface="Montserrat"/>
                       </a:endParaRPr>
                     </a:p>
                   </a:txBody>
                   <a:tcPr marL="91450" marR="91450" marT="45725" marB="45725">
                     <a:solidFill>
-                      <a:srgbClr val="1396AE"/>
+                      <a:srgbClr val="0070C0"/>
                     </a:solidFill>
                   </a:tcPr>
                 </a:tc>
@@ -20102,14 +20503,17 @@
                       </a:pPr>
                       <a:r>
                         <a:rPr lang="en-GB" sz="1200" b="1">
-                          <a:latin typeface="Montserrat"/>
+                          <a:latin typeface="Calibri Light" panose="020F0302020204030204" pitchFamily="34" charset="0"/>
                           <a:ea typeface="Montserrat"/>
-                          <a:cs typeface="Montserrat"/>
+                          <a:cs typeface="Calibri Light" panose="020F0302020204030204" pitchFamily="34" charset="0"/>
                           <a:sym typeface="Montserrat"/>
                         </a:rPr>
                         <a:t>Current process need to be able to order online.</a:t>
                       </a:r>
-                      <a:endParaRPr sz="1200" b="1"/>
+                      <a:endParaRPr sz="1200" b="1">
+                        <a:latin typeface="Calibri Light" panose="020F0302020204030204" pitchFamily="34" charset="0"/>
+                        <a:cs typeface="Calibri Light" panose="020F0302020204030204" pitchFamily="34" charset="0"/>
+                      </a:endParaRPr>
                     </a:p>
                   </a:txBody>
                   <a:tcPr marL="91450" marR="91450" marT="45725" marB="45725"/>
@@ -20130,14 +20534,17 @@
                       </a:pPr>
                       <a:r>
                         <a:rPr lang="en-GB" sz="1200" b="1">
-                          <a:latin typeface="Montserrat"/>
+                          <a:latin typeface="Calibri Light" panose="020F0302020204030204" pitchFamily="34" charset="0"/>
                           <a:ea typeface="Montserrat"/>
-                          <a:cs typeface="Montserrat"/>
+                          <a:cs typeface="Calibri Light" panose="020F0302020204030204" pitchFamily="34" charset="0"/>
                           <a:sym typeface="Montserrat"/>
                         </a:rPr>
                         <a:t>High</a:t>
                       </a:r>
-                      <a:endParaRPr sz="1200" b="1"/>
+                      <a:endParaRPr sz="1200" b="1">
+                        <a:latin typeface="Calibri Light" panose="020F0302020204030204" pitchFamily="34" charset="0"/>
+                        <a:cs typeface="Calibri Light" panose="020F0302020204030204" pitchFamily="34" charset="0"/>
+                      </a:endParaRPr>
                     </a:p>
                   </a:txBody>
                   <a:tcPr marL="91450" marR="91450" marT="45725" marB="45725"/>
@@ -20158,14 +20565,17 @@
                       </a:pPr>
                       <a:r>
                         <a:rPr lang="en-GB" sz="1200" b="1">
-                          <a:latin typeface="Montserrat"/>
+                          <a:latin typeface="Calibri Light" panose="020F0302020204030204" pitchFamily="34" charset="0"/>
                           <a:ea typeface="Montserrat"/>
-                          <a:cs typeface="Montserrat"/>
+                          <a:cs typeface="Calibri Light" panose="020F0302020204030204" pitchFamily="34" charset="0"/>
                           <a:sym typeface="Montserrat"/>
                         </a:rPr>
                         <a:t>Medium Rare</a:t>
                       </a:r>
-                      <a:endParaRPr sz="1200" b="1"/>
+                      <a:endParaRPr sz="1200" b="1">
+                        <a:latin typeface="Calibri Light" panose="020F0302020204030204" pitchFamily="34" charset="0"/>
+                        <a:cs typeface="Calibri Light" panose="020F0302020204030204" pitchFamily="34" charset="0"/>
+                      </a:endParaRPr>
                     </a:p>
                   </a:txBody>
                   <a:tcPr marL="91450" marR="91450" marT="45725" marB="45725"/>
@@ -20186,17 +20596,17 @@
                       </a:pPr>
                       <a:r>
                         <a:rPr lang="en-GB" sz="1200" b="1">
-                          <a:latin typeface="Montserrat"/>
+                          <a:latin typeface="Calibri Light" panose="020F0302020204030204" pitchFamily="34" charset="0"/>
                           <a:ea typeface="Montserrat"/>
-                          <a:cs typeface="Montserrat"/>
+                          <a:cs typeface="Calibri Light" panose="020F0302020204030204" pitchFamily="34" charset="0"/>
                           <a:sym typeface="Montserrat"/>
                         </a:rPr>
                         <a:t>Y</a:t>
                       </a:r>
                       <a:endParaRPr sz="1200" b="1">
-                        <a:latin typeface="Montserrat"/>
+                        <a:latin typeface="Calibri Light" panose="020F0302020204030204" pitchFamily="34" charset="0"/>
                         <a:ea typeface="Montserrat"/>
-                        <a:cs typeface="Montserrat"/>
+                        <a:cs typeface="Calibri Light" panose="020F0302020204030204" pitchFamily="34" charset="0"/>
                         <a:sym typeface="Montserrat"/>
                       </a:endParaRPr>
                     </a:p>
@@ -20226,14 +20636,17 @@
                       </a:pPr>
                       <a:r>
                         <a:rPr lang="en-GB" sz="1200" b="1">
-                          <a:latin typeface="Montserrat"/>
+                          <a:latin typeface="Calibri Light" panose="020F0302020204030204" pitchFamily="34" charset="0"/>
                           <a:ea typeface="Montserrat"/>
-                          <a:cs typeface="Montserrat"/>
+                          <a:cs typeface="Calibri Light" panose="020F0302020204030204" pitchFamily="34" charset="0"/>
                           <a:sym typeface="Montserrat"/>
                         </a:rPr>
                         <a:t>User can select the amount of heads at an event</a:t>
                       </a:r>
-                      <a:endParaRPr sz="1200" b="1"/>
+                      <a:endParaRPr sz="1200" b="1">
+                        <a:latin typeface="Calibri Light" panose="020F0302020204030204" pitchFamily="34" charset="0"/>
+                        <a:cs typeface="Calibri Light" panose="020F0302020204030204" pitchFamily="34" charset="0"/>
+                      </a:endParaRPr>
                     </a:p>
                   </a:txBody>
                   <a:tcPr marL="91450" marR="91450" marT="45725" marB="45725">
@@ -20264,14 +20677,17 @@
                       </a:pPr>
                       <a:r>
                         <a:rPr lang="en-GB" sz="1200" b="1">
-                          <a:latin typeface="Montserrat"/>
+                          <a:latin typeface="Calibri Light" panose="020F0302020204030204" pitchFamily="34" charset="0"/>
                           <a:ea typeface="Montserrat"/>
-                          <a:cs typeface="Montserrat"/>
+                          <a:cs typeface="Calibri Light" panose="020F0302020204030204" pitchFamily="34" charset="0"/>
                           <a:sym typeface="Montserrat"/>
                         </a:rPr>
                         <a:t>High</a:t>
                       </a:r>
-                      <a:endParaRPr sz="1200" b="1"/>
+                      <a:endParaRPr sz="1200" b="1">
+                        <a:latin typeface="Calibri Light" panose="020F0302020204030204" pitchFamily="34" charset="0"/>
+                        <a:cs typeface="Calibri Light" panose="020F0302020204030204" pitchFamily="34" charset="0"/>
+                      </a:endParaRPr>
                     </a:p>
                   </a:txBody>
                   <a:tcPr marL="91450" marR="91450" marT="45725" marB="45725">
@@ -20302,14 +20718,17 @@
                       </a:pPr>
                       <a:r>
                         <a:rPr lang="en-GB" sz="1200" b="1">
-                          <a:latin typeface="Montserrat"/>
+                          <a:latin typeface="Calibri Light" panose="020F0302020204030204" pitchFamily="34" charset="0"/>
                           <a:ea typeface="Montserrat"/>
-                          <a:cs typeface="Montserrat"/>
+                          <a:cs typeface="Calibri Light" panose="020F0302020204030204" pitchFamily="34" charset="0"/>
                           <a:sym typeface="Montserrat"/>
                         </a:rPr>
                         <a:t>Medium Rare</a:t>
                       </a:r>
-                      <a:endParaRPr sz="1200" b="1"/>
+                      <a:endParaRPr sz="1200" b="1">
+                        <a:latin typeface="Calibri Light" panose="020F0302020204030204" pitchFamily="34" charset="0"/>
+                        <a:cs typeface="Calibri Light" panose="020F0302020204030204" pitchFamily="34" charset="0"/>
+                      </a:endParaRPr>
                     </a:p>
                   </a:txBody>
                   <a:tcPr marL="91450" marR="91450" marT="45725" marB="45725">
@@ -20340,17 +20759,17 @@
                       </a:pPr>
                       <a:r>
                         <a:rPr lang="en-GB" sz="1200" b="1">
-                          <a:latin typeface="Montserrat"/>
+                          <a:latin typeface="Calibri Light" panose="020F0302020204030204" pitchFamily="34" charset="0"/>
                           <a:ea typeface="Montserrat"/>
-                          <a:cs typeface="Montserrat"/>
+                          <a:cs typeface="Calibri Light" panose="020F0302020204030204" pitchFamily="34" charset="0"/>
                           <a:sym typeface="Montserrat"/>
                         </a:rPr>
                         <a:t>Y</a:t>
                       </a:r>
                       <a:endParaRPr sz="1200" b="1">
-                        <a:latin typeface="Montserrat"/>
+                        <a:latin typeface="Calibri Light" panose="020F0302020204030204" pitchFamily="34" charset="0"/>
                         <a:ea typeface="Montserrat"/>
-                        <a:cs typeface="Montserrat"/>
+                        <a:cs typeface="Calibri Light" panose="020F0302020204030204" pitchFamily="34" charset="0"/>
                         <a:sym typeface="Montserrat"/>
                       </a:endParaRPr>
                     </a:p>
@@ -20390,17 +20809,17 @@
                       </a:pPr>
                       <a:r>
                         <a:rPr lang="en-GB" sz="1200" b="1">
-                          <a:latin typeface="Montserrat"/>
+                          <a:latin typeface="Calibri Light" panose="020F0302020204030204" pitchFamily="34" charset="0"/>
                           <a:ea typeface="Montserrat"/>
-                          <a:cs typeface="Montserrat"/>
+                          <a:cs typeface="Calibri Light" panose="020F0302020204030204" pitchFamily="34" charset="0"/>
                           <a:sym typeface="Montserrat"/>
                         </a:rPr>
                         <a:t>Integrate invoice system with the web application</a:t>
                       </a:r>
                       <a:endParaRPr sz="1200" b="1">
-                        <a:latin typeface="Montserrat"/>
+                        <a:latin typeface="Calibri Light" panose="020F0302020204030204" pitchFamily="34" charset="0"/>
                         <a:ea typeface="Montserrat"/>
-                        <a:cs typeface="Montserrat"/>
+                        <a:cs typeface="Calibri Light" panose="020F0302020204030204" pitchFamily="34" charset="0"/>
                         <a:sym typeface="Montserrat"/>
                       </a:endParaRPr>
                     </a:p>
@@ -20460,17 +20879,17 @@
                       </a:pPr>
                       <a:r>
                         <a:rPr lang="en-GB" sz="1200" b="1">
-                          <a:latin typeface="Montserrat"/>
+                          <a:latin typeface="Calibri Light" panose="020F0302020204030204" pitchFamily="34" charset="0"/>
                           <a:ea typeface="Montserrat"/>
-                          <a:cs typeface="Montserrat"/>
+                          <a:cs typeface="Calibri Light" panose="020F0302020204030204" pitchFamily="34" charset="0"/>
                           <a:sym typeface="Montserrat"/>
                         </a:rPr>
                         <a:t>Medium</a:t>
                       </a:r>
                       <a:endParaRPr sz="1200" b="1">
-                        <a:latin typeface="Montserrat"/>
+                        <a:latin typeface="Calibri Light" panose="020F0302020204030204" pitchFamily="34" charset="0"/>
                         <a:ea typeface="Montserrat"/>
-                        <a:cs typeface="Montserrat"/>
+                        <a:cs typeface="Calibri Light" panose="020F0302020204030204" pitchFamily="34" charset="0"/>
                         <a:sym typeface="Montserrat"/>
                       </a:endParaRPr>
                     </a:p>
@@ -20530,17 +20949,17 @@
                       </a:pPr>
                       <a:r>
                         <a:rPr lang="en-GB" sz="1200" b="1">
-                          <a:latin typeface="Montserrat"/>
+                          <a:latin typeface="Calibri Light" panose="020F0302020204030204" pitchFamily="34" charset="0"/>
                           <a:ea typeface="Montserrat"/>
-                          <a:cs typeface="Montserrat"/>
+                          <a:cs typeface="Calibri Light" panose="020F0302020204030204" pitchFamily="34" charset="0"/>
                           <a:sym typeface="Montserrat"/>
                         </a:rPr>
                         <a:t>Well Done</a:t>
                       </a:r>
                       <a:endParaRPr sz="1200" b="1">
-                        <a:latin typeface="Montserrat"/>
+                        <a:latin typeface="Calibri Light" panose="020F0302020204030204" pitchFamily="34" charset="0"/>
                         <a:ea typeface="Montserrat"/>
-                        <a:cs typeface="Montserrat"/>
+                        <a:cs typeface="Calibri Light" panose="020F0302020204030204" pitchFamily="34" charset="0"/>
                         <a:sym typeface="Montserrat"/>
                       </a:endParaRPr>
                     </a:p>
@@ -20600,17 +21019,17 @@
                       </a:pPr>
                       <a:r>
                         <a:rPr lang="en-GB" sz="1200" b="1">
-                          <a:latin typeface="Montserrat"/>
+                          <a:latin typeface="Calibri Light" panose="020F0302020204030204" pitchFamily="34" charset="0"/>
                           <a:ea typeface="Montserrat"/>
-                          <a:cs typeface="Montserrat"/>
+                          <a:cs typeface="Calibri Light" panose="020F0302020204030204" pitchFamily="34" charset="0"/>
                           <a:sym typeface="Montserrat"/>
                         </a:rPr>
                         <a:t>Y</a:t>
                       </a:r>
                       <a:endParaRPr sz="1200" b="1">
-                        <a:latin typeface="Montserrat"/>
+                        <a:latin typeface="Calibri Light" panose="020F0302020204030204" pitchFamily="34" charset="0"/>
                         <a:ea typeface="Montserrat"/>
-                        <a:cs typeface="Montserrat"/>
+                        <a:cs typeface="Calibri Light" panose="020F0302020204030204" pitchFamily="34" charset="0"/>
                         <a:sym typeface="Montserrat"/>
                       </a:endParaRPr>
                     </a:p>
@@ -20677,17 +21096,17 @@
                       </a:pPr>
                       <a:r>
                         <a:rPr lang="en-GB" sz="1200" b="1">
-                          <a:latin typeface="Montserrat"/>
+                          <a:latin typeface="Calibri Light" panose="020F0302020204030204" pitchFamily="34" charset="0"/>
                           <a:ea typeface="Montserrat"/>
-                          <a:cs typeface="Montserrat"/>
+                          <a:cs typeface="Calibri Light" panose="020F0302020204030204" pitchFamily="34" charset="0"/>
                           <a:sym typeface="Montserrat"/>
                         </a:rPr>
                         <a:t>Integrate the application with the current order system</a:t>
                       </a:r>
                       <a:endParaRPr sz="1200" b="1">
-                        <a:latin typeface="Montserrat"/>
+                        <a:latin typeface="Calibri Light" panose="020F0302020204030204" pitchFamily="34" charset="0"/>
                         <a:ea typeface="Montserrat"/>
-                        <a:cs typeface="Montserrat"/>
+                        <a:cs typeface="Calibri Light" panose="020F0302020204030204" pitchFamily="34" charset="0"/>
                         <a:sym typeface="Montserrat"/>
                       </a:endParaRPr>
                     </a:p>
@@ -20747,17 +21166,17 @@
                       </a:pPr>
                       <a:r>
                         <a:rPr lang="en-GB" sz="1200" b="1">
-                          <a:latin typeface="Montserrat"/>
+                          <a:latin typeface="Calibri Light" panose="020F0302020204030204" pitchFamily="34" charset="0"/>
                           <a:ea typeface="Montserrat"/>
-                          <a:cs typeface="Montserrat"/>
+                          <a:cs typeface="Calibri Light" panose="020F0302020204030204" pitchFamily="34" charset="0"/>
                           <a:sym typeface="Montserrat"/>
                         </a:rPr>
                         <a:t>High</a:t>
                       </a:r>
                       <a:endParaRPr sz="1200" b="1">
-                        <a:latin typeface="Montserrat"/>
+                        <a:latin typeface="Calibri Light" panose="020F0302020204030204" pitchFamily="34" charset="0"/>
                         <a:ea typeface="Montserrat"/>
-                        <a:cs typeface="Montserrat"/>
+                        <a:cs typeface="Calibri Light" panose="020F0302020204030204" pitchFamily="34" charset="0"/>
                         <a:sym typeface="Montserrat"/>
                       </a:endParaRPr>
                     </a:p>
@@ -20817,17 +21236,17 @@
                       </a:pPr>
                       <a:r>
                         <a:rPr lang="en-GB" sz="1200" b="1">
-                          <a:latin typeface="Montserrat"/>
+                          <a:latin typeface="Calibri Light" panose="020F0302020204030204" pitchFamily="34" charset="0"/>
                           <a:ea typeface="Montserrat"/>
-                          <a:cs typeface="Montserrat"/>
+                          <a:cs typeface="Calibri Light" panose="020F0302020204030204" pitchFamily="34" charset="0"/>
                           <a:sym typeface="Montserrat"/>
                         </a:rPr>
                         <a:t>Medium Well</a:t>
                       </a:r>
                       <a:endParaRPr sz="1200" b="1">
-                        <a:latin typeface="Montserrat"/>
+                        <a:latin typeface="Calibri Light" panose="020F0302020204030204" pitchFamily="34" charset="0"/>
                         <a:ea typeface="Montserrat"/>
-                        <a:cs typeface="Montserrat"/>
+                        <a:cs typeface="Calibri Light" panose="020F0302020204030204" pitchFamily="34" charset="0"/>
                         <a:sym typeface="Montserrat"/>
                       </a:endParaRPr>
                     </a:p>
@@ -20887,17 +21306,17 @@
                       </a:pPr>
                       <a:r>
                         <a:rPr lang="en-GB" sz="1200" b="1">
-                          <a:latin typeface="Montserrat"/>
+                          <a:latin typeface="Calibri Light" panose="020F0302020204030204" pitchFamily="34" charset="0"/>
                           <a:ea typeface="Montserrat"/>
-                          <a:cs typeface="Montserrat"/>
+                          <a:cs typeface="Calibri Light" panose="020F0302020204030204" pitchFamily="34" charset="0"/>
                           <a:sym typeface="Montserrat"/>
                         </a:rPr>
                         <a:t>Y</a:t>
                       </a:r>
                       <a:endParaRPr sz="1200" b="1">
-                        <a:latin typeface="Montserrat"/>
+                        <a:latin typeface="Calibri Light" panose="020F0302020204030204" pitchFamily="34" charset="0"/>
                         <a:ea typeface="Montserrat"/>
-                        <a:cs typeface="Montserrat"/>
+                        <a:cs typeface="Calibri Light" panose="020F0302020204030204" pitchFamily="34" charset="0"/>
                         <a:sym typeface="Montserrat"/>
                       </a:endParaRPr>
                     </a:p>
@@ -20964,17 +21383,17 @@
                       </a:pPr>
                       <a:r>
                         <a:rPr lang="en-GB" sz="1200" b="1">
-                          <a:latin typeface="Montserrat"/>
+                          <a:latin typeface="Calibri Light" panose="020F0302020204030204" pitchFamily="34" charset="0"/>
                           <a:ea typeface="Montserrat"/>
-                          <a:cs typeface="Montserrat"/>
+                          <a:cs typeface="Calibri Light" panose="020F0302020204030204" pitchFamily="34" charset="0"/>
                           <a:sym typeface="Montserrat"/>
                         </a:rPr>
                         <a:t>Dietary Requirements</a:t>
                       </a:r>
                       <a:endParaRPr sz="1200" b="1">
-                        <a:latin typeface="Montserrat"/>
+                        <a:latin typeface="Calibri Light" panose="020F0302020204030204" pitchFamily="34" charset="0"/>
                         <a:ea typeface="Montserrat"/>
-                        <a:cs typeface="Montserrat"/>
+                        <a:cs typeface="Calibri Light" panose="020F0302020204030204" pitchFamily="34" charset="0"/>
                         <a:sym typeface="Montserrat"/>
                       </a:endParaRPr>
                     </a:p>
@@ -21034,17 +21453,17 @@
                       </a:pPr>
                       <a:r>
                         <a:rPr lang="en-GB" sz="1200" b="1">
-                          <a:latin typeface="Montserrat"/>
+                          <a:latin typeface="Calibri Light" panose="020F0302020204030204" pitchFamily="34" charset="0"/>
                           <a:ea typeface="Montserrat"/>
-                          <a:cs typeface="Montserrat"/>
+                          <a:cs typeface="Calibri Light" panose="020F0302020204030204" pitchFamily="34" charset="0"/>
                           <a:sym typeface="Montserrat"/>
                         </a:rPr>
                         <a:t>High</a:t>
                       </a:r>
                       <a:endParaRPr sz="1200" b="1">
-                        <a:latin typeface="Montserrat"/>
+                        <a:latin typeface="Calibri Light" panose="020F0302020204030204" pitchFamily="34" charset="0"/>
                         <a:ea typeface="Montserrat"/>
-                        <a:cs typeface="Montserrat"/>
+                        <a:cs typeface="Calibri Light" panose="020F0302020204030204" pitchFamily="34" charset="0"/>
                         <a:sym typeface="Montserrat"/>
                       </a:endParaRPr>
                     </a:p>
@@ -21104,17 +21523,17 @@
                       </a:pPr>
                       <a:r>
                         <a:rPr lang="en-GB" sz="1200" b="1">
-                          <a:latin typeface="Montserrat"/>
+                          <a:latin typeface="Calibri Light" panose="020F0302020204030204" pitchFamily="34" charset="0"/>
                           <a:ea typeface="Montserrat"/>
-                          <a:cs typeface="Montserrat"/>
+                          <a:cs typeface="Calibri Light" panose="020F0302020204030204" pitchFamily="34" charset="0"/>
                           <a:sym typeface="Montserrat"/>
                         </a:rPr>
                         <a:t>Medium Rare</a:t>
                       </a:r>
                       <a:endParaRPr sz="1200" b="1">
-                        <a:latin typeface="Montserrat"/>
+                        <a:latin typeface="Calibri Light" panose="020F0302020204030204" pitchFamily="34" charset="0"/>
                         <a:ea typeface="Montserrat"/>
-                        <a:cs typeface="Montserrat"/>
+                        <a:cs typeface="Calibri Light" panose="020F0302020204030204" pitchFamily="34" charset="0"/>
                         <a:sym typeface="Montserrat"/>
                       </a:endParaRPr>
                     </a:p>
@@ -21174,17 +21593,17 @@
                       </a:pPr>
                       <a:r>
                         <a:rPr lang="en-GB" sz="1200" b="1">
-                          <a:latin typeface="Montserrat"/>
+                          <a:latin typeface="Calibri Light" panose="020F0302020204030204" pitchFamily="34" charset="0"/>
                           <a:ea typeface="Montserrat"/>
-                          <a:cs typeface="Montserrat"/>
+                          <a:cs typeface="Calibri Light" panose="020F0302020204030204" pitchFamily="34" charset="0"/>
                           <a:sym typeface="Montserrat"/>
                         </a:rPr>
                         <a:t>Y</a:t>
                       </a:r>
                       <a:endParaRPr sz="1200" b="1">
-                        <a:latin typeface="Montserrat"/>
+                        <a:latin typeface="Calibri Light" panose="020F0302020204030204" pitchFamily="34" charset="0"/>
                         <a:ea typeface="Montserrat"/>
-                        <a:cs typeface="Montserrat"/>
+                        <a:cs typeface="Calibri Light" panose="020F0302020204030204" pitchFamily="34" charset="0"/>
                         <a:sym typeface="Montserrat"/>
                       </a:endParaRPr>
                     </a:p>
@@ -21251,17 +21670,17 @@
                       </a:pPr>
                       <a:r>
                         <a:rPr lang="en-GB" sz="1200" b="1">
-                          <a:latin typeface="Montserrat"/>
+                          <a:latin typeface="Calibri Light" panose="020F0302020204030204" pitchFamily="34" charset="0"/>
                           <a:ea typeface="Montserrat"/>
-                          <a:cs typeface="Montserrat"/>
+                          <a:cs typeface="Calibri Light" panose="020F0302020204030204" pitchFamily="34" charset="0"/>
                           <a:sym typeface="Montserrat"/>
                         </a:rPr>
                         <a:t>Date</a:t>
                       </a:r>
                       <a:endParaRPr sz="1200" b="1">
-                        <a:latin typeface="Montserrat"/>
+                        <a:latin typeface="Calibri Light" panose="020F0302020204030204" pitchFamily="34" charset="0"/>
                         <a:ea typeface="Montserrat"/>
-                        <a:cs typeface="Montserrat"/>
+                        <a:cs typeface="Calibri Light" panose="020F0302020204030204" pitchFamily="34" charset="0"/>
                         <a:sym typeface="Montserrat"/>
                       </a:endParaRPr>
                     </a:p>
@@ -21321,17 +21740,17 @@
                       </a:pPr>
                       <a:r>
                         <a:rPr lang="en-GB" sz="1200" b="1">
-                          <a:latin typeface="Montserrat"/>
+                          <a:latin typeface="Calibri Light" panose="020F0302020204030204" pitchFamily="34" charset="0"/>
                           <a:ea typeface="Montserrat"/>
-                          <a:cs typeface="Montserrat"/>
+                          <a:cs typeface="Calibri Light" panose="020F0302020204030204" pitchFamily="34" charset="0"/>
                           <a:sym typeface="Montserrat"/>
                         </a:rPr>
                         <a:t>High</a:t>
                       </a:r>
                       <a:endParaRPr sz="1200" b="1">
-                        <a:latin typeface="Montserrat"/>
+                        <a:latin typeface="Calibri Light" panose="020F0302020204030204" pitchFamily="34" charset="0"/>
                         <a:ea typeface="Montserrat"/>
-                        <a:cs typeface="Montserrat"/>
+                        <a:cs typeface="Calibri Light" panose="020F0302020204030204" pitchFamily="34" charset="0"/>
                         <a:sym typeface="Montserrat"/>
                       </a:endParaRPr>
                     </a:p>
@@ -21391,17 +21810,17 @@
                       </a:pPr>
                       <a:r>
                         <a:rPr lang="en-GB" sz="1200" b="1">
-                          <a:latin typeface="Montserrat"/>
+                          <a:latin typeface="Calibri Light" panose="020F0302020204030204" pitchFamily="34" charset="0"/>
                           <a:ea typeface="Montserrat"/>
-                          <a:cs typeface="Montserrat"/>
+                          <a:cs typeface="Calibri Light" panose="020F0302020204030204" pitchFamily="34" charset="0"/>
                           <a:sym typeface="Montserrat"/>
                         </a:rPr>
                         <a:t>Medium</a:t>
                       </a:r>
                       <a:endParaRPr sz="1200" b="1">
-                        <a:latin typeface="Montserrat"/>
+                        <a:latin typeface="Calibri Light" panose="020F0302020204030204" pitchFamily="34" charset="0"/>
                         <a:ea typeface="Montserrat"/>
-                        <a:cs typeface="Montserrat"/>
+                        <a:cs typeface="Calibri Light" panose="020F0302020204030204" pitchFamily="34" charset="0"/>
                         <a:sym typeface="Montserrat"/>
                       </a:endParaRPr>
                     </a:p>
@@ -21461,17 +21880,17 @@
                       </a:pPr>
                       <a:r>
                         <a:rPr lang="en-GB" sz="1200" b="1">
-                          <a:latin typeface="Montserrat"/>
+                          <a:latin typeface="Calibri Light" panose="020F0302020204030204" pitchFamily="34" charset="0"/>
                           <a:ea typeface="Montserrat"/>
-                          <a:cs typeface="Montserrat"/>
+                          <a:cs typeface="Calibri Light" panose="020F0302020204030204" pitchFamily="34" charset="0"/>
                           <a:sym typeface="Montserrat"/>
                         </a:rPr>
                         <a:t>Y</a:t>
                       </a:r>
                       <a:endParaRPr sz="1200" b="1">
-                        <a:latin typeface="Montserrat"/>
+                        <a:latin typeface="Calibri Light" panose="020F0302020204030204" pitchFamily="34" charset="0"/>
                         <a:ea typeface="Montserrat"/>
-                        <a:cs typeface="Montserrat"/>
+                        <a:cs typeface="Calibri Light" panose="020F0302020204030204" pitchFamily="34" charset="0"/>
                         <a:sym typeface="Montserrat"/>
                       </a:endParaRPr>
                     </a:p>
@@ -21537,10 +21956,16 @@
                         <a:buNone/>
                       </a:pPr>
                       <a:r>
-                        <a:rPr lang="en-GB" sz="1200"/>
+                        <a:rPr lang="en-GB" sz="1200">
+                          <a:latin typeface="Calibri Light" panose="020F0302020204030204" pitchFamily="34" charset="0"/>
+                          <a:cs typeface="Calibri Light" panose="020F0302020204030204" pitchFamily="34" charset="0"/>
+                        </a:rPr>
                         <a:t>Order status</a:t>
                       </a:r>
-                      <a:endParaRPr sz="1200"/>
+                      <a:endParaRPr sz="1200">
+                        <a:latin typeface="Calibri Light" panose="020F0302020204030204" pitchFamily="34" charset="0"/>
+                        <a:cs typeface="Calibri Light" panose="020F0302020204030204" pitchFamily="34" charset="0"/>
+                      </a:endParaRPr>
                     </a:p>
                   </a:txBody>
                   <a:tcPr marL="91450" marR="91450" marT="45725" marB="45725">
@@ -21571,17 +21996,17 @@
                       </a:pPr>
                       <a:r>
                         <a:rPr lang="en-GB" sz="1200">
-                          <a:latin typeface="Montserrat Light"/>
+                          <a:latin typeface="Calibri Light" panose="020F0302020204030204" pitchFamily="34" charset="0"/>
                           <a:ea typeface="Montserrat Light"/>
-                          <a:cs typeface="Montserrat Light"/>
+                          <a:cs typeface="Calibri Light" panose="020F0302020204030204" pitchFamily="34" charset="0"/>
                           <a:sym typeface="Montserrat Light"/>
                         </a:rPr>
                         <a:t>Low</a:t>
                       </a:r>
                       <a:endParaRPr sz="1200">
-                        <a:latin typeface="Montserrat Light"/>
+                        <a:latin typeface="Calibri Light" panose="020F0302020204030204" pitchFamily="34" charset="0"/>
                         <a:ea typeface="Montserrat Light"/>
-                        <a:cs typeface="Montserrat Light"/>
+                        <a:cs typeface="Calibri Light" panose="020F0302020204030204" pitchFamily="34" charset="0"/>
                         <a:sym typeface="Montserrat Light"/>
                       </a:endParaRPr>
                     </a:p>
@@ -21613,10 +22038,16 @@
                         <a:buNone/>
                       </a:pPr>
                       <a:r>
-                        <a:rPr lang="en-GB" sz="1200"/>
+                        <a:rPr lang="en-GB" sz="1200">
+                          <a:latin typeface="Calibri Light" panose="020F0302020204030204" pitchFamily="34" charset="0"/>
+                          <a:cs typeface="Calibri Light" panose="020F0302020204030204" pitchFamily="34" charset="0"/>
+                        </a:rPr>
                         <a:t>Medium Well</a:t>
                       </a:r>
-                      <a:endParaRPr sz="1200"/>
+                      <a:endParaRPr sz="1200">
+                        <a:latin typeface="Calibri Light" panose="020F0302020204030204" pitchFamily="34" charset="0"/>
+                        <a:cs typeface="Calibri Light" panose="020F0302020204030204" pitchFamily="34" charset="0"/>
+                      </a:endParaRPr>
                     </a:p>
                   </a:txBody>
                   <a:tcPr marL="91450" marR="91450" marT="45725" marB="45725">
@@ -21646,10 +22077,16 @@
                         <a:buNone/>
                       </a:pPr>
                       <a:r>
-                        <a:rPr lang="en-GB" sz="1200"/>
+                        <a:rPr lang="en-GB" sz="1200">
+                          <a:latin typeface="Calibri Light" panose="020F0302020204030204" pitchFamily="34" charset="0"/>
+                          <a:cs typeface="Calibri Light" panose="020F0302020204030204" pitchFamily="34" charset="0"/>
+                        </a:rPr>
                         <a:t>Y</a:t>
                       </a:r>
-                      <a:endParaRPr sz="1200"/>
+                      <a:endParaRPr sz="1200">
+                        <a:latin typeface="Calibri Light" panose="020F0302020204030204" pitchFamily="34" charset="0"/>
+                        <a:cs typeface="Calibri Light" panose="020F0302020204030204" pitchFamily="34" charset="0"/>
+                      </a:endParaRPr>
                     </a:p>
                   </a:txBody>
                   <a:tcPr marL="91450" marR="91450" marT="45725" marB="45725">
@@ -21686,10 +22123,16 @@
                         <a:buNone/>
                       </a:pPr>
                       <a:r>
-                        <a:rPr lang="en-GB" sz="1200"/>
+                        <a:rPr lang="en-GB" sz="1200">
+                          <a:latin typeface="Calibri Light" panose="020F0302020204030204" pitchFamily="34" charset="0"/>
+                          <a:cs typeface="Calibri Light" panose="020F0302020204030204" pitchFamily="34" charset="0"/>
+                        </a:rPr>
                         <a:t>List all available pizzas</a:t>
                       </a:r>
-                      <a:endParaRPr sz="1200"/>
+                      <a:endParaRPr sz="1200">
+                        <a:latin typeface="Calibri Light" panose="020F0302020204030204" pitchFamily="34" charset="0"/>
+                        <a:cs typeface="Calibri Light" panose="020F0302020204030204" pitchFamily="34" charset="0"/>
+                      </a:endParaRPr>
                     </a:p>
                   </a:txBody>
                   <a:tcPr marL="91450" marR="91450" marT="45725" marB="45725"/>
@@ -21710,17 +22153,17 @@
                       </a:pPr>
                       <a:r>
                         <a:rPr lang="en-GB" sz="1200">
-                          <a:latin typeface="Montserrat Light"/>
+                          <a:latin typeface="Calibri Light" panose="020F0302020204030204" pitchFamily="34" charset="0"/>
                           <a:ea typeface="Montserrat Light"/>
-                          <a:cs typeface="Montserrat Light"/>
+                          <a:cs typeface="Calibri Light" panose="020F0302020204030204" pitchFamily="34" charset="0"/>
                           <a:sym typeface="Montserrat Light"/>
                         </a:rPr>
                         <a:t>Low</a:t>
                       </a:r>
                       <a:endParaRPr sz="1200">
-                        <a:latin typeface="Montserrat Light"/>
+                        <a:latin typeface="Calibri Light" panose="020F0302020204030204" pitchFamily="34" charset="0"/>
                         <a:ea typeface="Montserrat Light"/>
-                        <a:cs typeface="Montserrat Light"/>
+                        <a:cs typeface="Calibri Light" panose="020F0302020204030204" pitchFamily="34" charset="0"/>
                         <a:sym typeface="Montserrat Light"/>
                       </a:endParaRPr>
                     </a:p>
@@ -21742,10 +22185,16 @@
                         <a:buNone/>
                       </a:pPr>
                       <a:r>
-                        <a:rPr lang="en-GB" sz="1200"/>
+                        <a:rPr lang="en-GB" sz="1200">
+                          <a:latin typeface="Calibri Light" panose="020F0302020204030204" pitchFamily="34" charset="0"/>
+                          <a:cs typeface="Calibri Light" panose="020F0302020204030204" pitchFamily="34" charset="0"/>
+                        </a:rPr>
                         <a:t>Rare</a:t>
                       </a:r>
-                      <a:endParaRPr sz="1200"/>
+                      <a:endParaRPr sz="1200">
+                        <a:latin typeface="Calibri Light" panose="020F0302020204030204" pitchFamily="34" charset="0"/>
+                        <a:cs typeface="Calibri Light" panose="020F0302020204030204" pitchFamily="34" charset="0"/>
+                      </a:endParaRPr>
                     </a:p>
                   </a:txBody>
                   <a:tcPr marL="91450" marR="91450" marT="45725" marB="45725"/>
@@ -21765,10 +22214,16 @@
                         <a:buNone/>
                       </a:pPr>
                       <a:r>
-                        <a:rPr lang="en-GB" sz="1200"/>
+                        <a:rPr lang="en-GB" sz="1200">
+                          <a:latin typeface="Calibri Light" panose="020F0302020204030204" pitchFamily="34" charset="0"/>
+                          <a:cs typeface="Calibri Light" panose="020F0302020204030204" pitchFamily="34" charset="0"/>
+                        </a:rPr>
                         <a:t>Y</a:t>
                       </a:r>
-                      <a:endParaRPr sz="1200"/>
+                      <a:endParaRPr sz="1200">
+                        <a:latin typeface="Calibri Light" panose="020F0302020204030204" pitchFamily="34" charset="0"/>
+                        <a:cs typeface="Calibri Light" panose="020F0302020204030204" pitchFamily="34" charset="0"/>
+                      </a:endParaRPr>
                     </a:p>
                   </a:txBody>
                   <a:tcPr marL="91450" marR="91450" marT="45725" marB="45725"/>
@@ -21795,10 +22250,16 @@
                         <a:buNone/>
                       </a:pPr>
                       <a:r>
-                        <a:rPr lang="en-GB" sz="1200"/>
+                        <a:rPr lang="en-GB" sz="1200">
+                          <a:latin typeface="Calibri Light" panose="020F0302020204030204" pitchFamily="34" charset="0"/>
+                          <a:cs typeface="Calibri Light" panose="020F0302020204030204" pitchFamily="34" charset="0"/>
+                        </a:rPr>
                         <a:t>Edge case handling if user orders a lot of pizzas </a:t>
                       </a:r>
-                      <a:endParaRPr sz="1200"/>
+                      <a:endParaRPr sz="1200">
+                        <a:latin typeface="Calibri Light" panose="020F0302020204030204" pitchFamily="34" charset="0"/>
+                        <a:cs typeface="Calibri Light" panose="020F0302020204030204" pitchFamily="34" charset="0"/>
+                      </a:endParaRPr>
                     </a:p>
                   </a:txBody>
                   <a:tcPr marL="91450" marR="91450" marT="45725" marB="45725"/>
@@ -21819,17 +22280,17 @@
                       </a:pPr>
                       <a:r>
                         <a:rPr lang="en-GB" sz="1200">
-                          <a:latin typeface="Montserrat Light"/>
+                          <a:latin typeface="Calibri Light" panose="020F0302020204030204" pitchFamily="34" charset="0"/>
                           <a:ea typeface="Montserrat Light"/>
-                          <a:cs typeface="Montserrat Light"/>
+                          <a:cs typeface="Calibri Light" panose="020F0302020204030204" pitchFamily="34" charset="0"/>
                           <a:sym typeface="Montserrat Light"/>
                         </a:rPr>
                         <a:t>Medium</a:t>
                       </a:r>
                       <a:endParaRPr sz="1200">
-                        <a:latin typeface="Montserrat Light"/>
+                        <a:latin typeface="Calibri Light" panose="020F0302020204030204" pitchFamily="34" charset="0"/>
                         <a:ea typeface="Montserrat Light"/>
-                        <a:cs typeface="Montserrat Light"/>
+                        <a:cs typeface="Calibri Light" panose="020F0302020204030204" pitchFamily="34" charset="0"/>
                         <a:sym typeface="Montserrat Light"/>
                       </a:endParaRPr>
                     </a:p>
@@ -21851,10 +22312,16 @@
                         <a:buNone/>
                       </a:pPr>
                       <a:r>
-                        <a:rPr lang="en-GB" sz="1200"/>
+                        <a:rPr lang="en-GB" sz="1200">
+                          <a:latin typeface="Calibri Light" panose="020F0302020204030204" pitchFamily="34" charset="0"/>
+                          <a:cs typeface="Calibri Light" panose="020F0302020204030204" pitchFamily="34" charset="0"/>
+                        </a:rPr>
                         <a:t>Medium</a:t>
                       </a:r>
-                      <a:endParaRPr sz="1200"/>
+                      <a:endParaRPr sz="1200">
+                        <a:latin typeface="Calibri Light" panose="020F0302020204030204" pitchFamily="34" charset="0"/>
+                        <a:cs typeface="Calibri Light" panose="020F0302020204030204" pitchFamily="34" charset="0"/>
+                      </a:endParaRPr>
                     </a:p>
                   </a:txBody>
                   <a:tcPr marL="91450" marR="91450" marT="45725" marB="45725"/>
@@ -21874,10 +22341,16 @@
                         <a:buNone/>
                       </a:pPr>
                       <a:r>
-                        <a:rPr lang="en-GB" sz="1200" dirty="0"/>
+                        <a:rPr lang="en-GB" sz="1200" dirty="0">
+                          <a:latin typeface="Calibri Light" panose="020F0302020204030204" pitchFamily="34" charset="0"/>
+                          <a:cs typeface="Calibri Light" panose="020F0302020204030204" pitchFamily="34" charset="0"/>
+                        </a:rPr>
                         <a:t>Y</a:t>
                       </a:r>
-                      <a:endParaRPr sz="1200" dirty="0"/>
+                      <a:endParaRPr sz="1200" dirty="0">
+                        <a:latin typeface="Calibri Light" panose="020F0302020204030204" pitchFamily="34" charset="0"/>
+                        <a:cs typeface="Calibri Light" panose="020F0302020204030204" pitchFamily="34" charset="0"/>
+                      </a:endParaRPr>
                     </a:p>
                   </a:txBody>
                   <a:tcPr marL="91450" marR="91450" marT="45725" marB="45725"/>
@@ -21952,14 +22425,12 @@
               <a:buNone/>
             </a:pPr>
             <a:r>
-              <a:rPr lang="en-GB" b="1" dirty="0"/>
-              <a:t>Requirements</a:t>
+              <a:rPr lang="en-GB" dirty="0">
+                <a:latin typeface="Calibri Light" panose="020F0302020204030204" pitchFamily="34" charset="0"/>
+                <a:cs typeface="Calibri Light" panose="020F0302020204030204" pitchFamily="34" charset="0"/>
+              </a:rPr>
+              <a:t>REQUIREMENTS SPECIFICATION</a:t>
             </a:r>
-            <a:r>
-              <a:rPr lang="en-GB" dirty="0"/>
-              <a:t> Specification</a:t>
-            </a:r>
-            <a:endParaRPr dirty="0"/>
           </a:p>
         </p:txBody>
       </p:sp>
@@ -21998,14 +22469,19 @@
               <a:buNone/>
             </a:pPr>
             <a:r>
-              <a:rPr lang="en-GB">
+              <a:rPr lang="en-GB" b="1" dirty="0">
                 <a:solidFill>
                   <a:schemeClr val="dk1"/>
                 </a:solidFill>
+                <a:latin typeface="Calibri" panose="020F0502020204030204" pitchFamily="34" charset="0"/>
+                <a:cs typeface="Calibri" panose="020F0502020204030204" pitchFamily="34" charset="0"/>
               </a:rPr>
               <a:t>Web App:</a:t>
             </a:r>
-            <a:endParaRPr/>
+            <a:endParaRPr b="1" dirty="0">
+              <a:latin typeface="Calibri" panose="020F0502020204030204" pitchFamily="34" charset="0"/>
+              <a:cs typeface="Calibri" panose="020F0502020204030204" pitchFamily="34" charset="0"/>
+            </a:endParaRPr>
           </a:p>
           <a:p>
             <a:pPr marL="457200" lvl="0" indent="-317500" algn="l" rtl="0">
@@ -22019,10 +22495,16 @@
               <a:buChar char="-"/>
             </a:pPr>
             <a:r>
-              <a:rPr lang="en-GB"/>
+              <a:rPr lang="en-GB" dirty="0">
+                <a:latin typeface="Calibri" panose="020F0502020204030204" pitchFamily="34" charset="0"/>
+                <a:cs typeface="Calibri" panose="020F0502020204030204" pitchFamily="34" charset="0"/>
+              </a:rPr>
               <a:t>Customer has a choice of number of heads at an event</a:t>
             </a:r>
-            <a:endParaRPr/>
+            <a:endParaRPr dirty="0">
+              <a:latin typeface="Calibri" panose="020F0502020204030204" pitchFamily="34" charset="0"/>
+              <a:cs typeface="Calibri" panose="020F0502020204030204" pitchFamily="34" charset="0"/>
+            </a:endParaRPr>
           </a:p>
           <a:p>
             <a:pPr marL="457200" lvl="0" indent="-317500" algn="l" rtl="0">
@@ -22036,10 +22518,16 @@
               <a:buChar char="-"/>
             </a:pPr>
             <a:r>
-              <a:rPr lang="en-GB"/>
+              <a:rPr lang="en-GB" dirty="0">
+                <a:latin typeface="Calibri" panose="020F0502020204030204" pitchFamily="34" charset="0"/>
+                <a:cs typeface="Calibri" panose="020F0502020204030204" pitchFamily="34" charset="0"/>
+              </a:rPr>
               <a:t>Enter specific dietary requirements to make sure all of the customers needs are met for</a:t>
             </a:r>
-            <a:endParaRPr/>
+            <a:endParaRPr dirty="0">
+              <a:latin typeface="Calibri" panose="020F0502020204030204" pitchFamily="34" charset="0"/>
+              <a:cs typeface="Calibri" panose="020F0502020204030204" pitchFamily="34" charset="0"/>
+            </a:endParaRPr>
           </a:p>
           <a:p>
             <a:pPr marL="457200" lvl="0" indent="-317500" algn="l" rtl="0">
@@ -22053,10 +22541,16 @@
               <a:buChar char="-"/>
             </a:pPr>
             <a:r>
-              <a:rPr lang="en-GB"/>
+              <a:rPr lang="en-GB" dirty="0">
+                <a:latin typeface="Calibri" panose="020F0502020204030204" pitchFamily="34" charset="0"/>
+                <a:cs typeface="Calibri" panose="020F0502020204030204" pitchFamily="34" charset="0"/>
+              </a:rPr>
               <a:t>The customer also needs the ability to pick a date for when they would like to receive their pizza. No longer than 5 months in advance and not less than 24 hours !</a:t>
             </a:r>
-            <a:endParaRPr/>
+            <a:endParaRPr dirty="0">
+              <a:latin typeface="Calibri" panose="020F0502020204030204" pitchFamily="34" charset="0"/>
+              <a:cs typeface="Calibri" panose="020F0502020204030204" pitchFamily="34" charset="0"/>
+            </a:endParaRPr>
           </a:p>
           <a:p>
             <a:pPr marL="457200" lvl="0" indent="-317500" algn="l" rtl="0">
@@ -22070,10 +22564,16 @@
               <a:buChar char="-"/>
             </a:pPr>
             <a:r>
-              <a:rPr lang="en-GB"/>
+              <a:rPr lang="en-GB" dirty="0">
+                <a:latin typeface="Calibri" panose="020F0502020204030204" pitchFamily="34" charset="0"/>
+                <a:cs typeface="Calibri" panose="020F0502020204030204" pitchFamily="34" charset="0"/>
+              </a:rPr>
               <a:t>Customer can enter their address</a:t>
             </a:r>
-            <a:endParaRPr/>
+            <a:endParaRPr dirty="0">
+              <a:latin typeface="Calibri" panose="020F0502020204030204" pitchFamily="34" charset="0"/>
+              <a:cs typeface="Calibri" panose="020F0502020204030204" pitchFamily="34" charset="0"/>
+            </a:endParaRPr>
           </a:p>
           <a:p>
             <a:pPr marL="457200" lvl="0" indent="-317500" algn="l" rtl="0">
@@ -22087,10 +22587,16 @@
               <a:buChar char="-"/>
             </a:pPr>
             <a:r>
-              <a:rPr lang="en-GB"/>
+              <a:rPr lang="en-GB" dirty="0">
+                <a:latin typeface="Calibri" panose="020F0502020204030204" pitchFamily="34" charset="0"/>
+                <a:cs typeface="Calibri" panose="020F0502020204030204" pitchFamily="34" charset="0"/>
+              </a:rPr>
               <a:t>If the order is larger than 100 heads user has to order in 5 days in advance unless they would like to pay a fee of £50 to receive the pizza</a:t>
             </a:r>
-            <a:endParaRPr/>
+            <a:endParaRPr dirty="0">
+              <a:latin typeface="Calibri" panose="020F0502020204030204" pitchFamily="34" charset="0"/>
+              <a:cs typeface="Calibri" panose="020F0502020204030204" pitchFamily="34" charset="0"/>
+            </a:endParaRPr>
           </a:p>
           <a:p>
             <a:pPr marL="457200" lvl="0" indent="-317500" algn="l" rtl="0">
@@ -22104,10 +22610,16 @@
               <a:buChar char="-"/>
             </a:pPr>
             <a:r>
-              <a:rPr lang="en-GB"/>
+              <a:rPr lang="en-GB" dirty="0">
+                <a:latin typeface="Calibri" panose="020F0502020204030204" pitchFamily="34" charset="0"/>
+                <a:cs typeface="Calibri" panose="020F0502020204030204" pitchFamily="34" charset="0"/>
+              </a:rPr>
               <a:t>Display a price (Apply the appropriate discounts)</a:t>
             </a:r>
-            <a:endParaRPr/>
+            <a:endParaRPr dirty="0">
+              <a:latin typeface="Calibri" panose="020F0502020204030204" pitchFamily="34" charset="0"/>
+              <a:cs typeface="Calibri" panose="020F0502020204030204" pitchFamily="34" charset="0"/>
+            </a:endParaRPr>
           </a:p>
           <a:p>
             <a:pPr marL="457200" lvl="0" indent="-317500" algn="l" rtl="0">
@@ -22124,17 +22636,21 @@
               <a:buChar char="-"/>
             </a:pPr>
             <a:r>
-              <a:rPr lang="en-GB">
+              <a:rPr lang="en-GB" dirty="0">
                 <a:solidFill>
                   <a:schemeClr val="dk1"/>
                 </a:solidFill>
+                <a:latin typeface="Calibri" panose="020F0502020204030204" pitchFamily="34" charset="0"/>
+                <a:cs typeface="Calibri" panose="020F0502020204030204" pitchFamily="34" charset="0"/>
               </a:rPr>
               <a:t>Customers order is linked up with the current order system automatically.</a:t>
             </a:r>
-            <a:endParaRPr>
+            <a:endParaRPr dirty="0">
               <a:solidFill>
                 <a:schemeClr val="dk1"/>
               </a:solidFill>
+              <a:latin typeface="Calibri" panose="020F0502020204030204" pitchFamily="34" charset="0"/>
+              <a:cs typeface="Calibri" panose="020F0502020204030204" pitchFamily="34" charset="0"/>
             </a:endParaRPr>
           </a:p>
           <a:p>
@@ -22152,17 +22668,21 @@
               <a:buChar char="-"/>
             </a:pPr>
             <a:r>
-              <a:rPr lang="en-GB">
+              <a:rPr lang="en-GB" dirty="0">
                 <a:solidFill>
                   <a:schemeClr val="dk1"/>
                 </a:solidFill>
+                <a:latin typeface="Calibri" panose="020F0502020204030204" pitchFamily="34" charset="0"/>
+                <a:cs typeface="Calibri" panose="020F0502020204030204" pitchFamily="34" charset="0"/>
               </a:rPr>
               <a:t>Show order confirmation</a:t>
             </a:r>
-            <a:endParaRPr>
+            <a:endParaRPr dirty="0">
               <a:solidFill>
                 <a:schemeClr val="dk1"/>
               </a:solidFill>
+              <a:latin typeface="Calibri" panose="020F0502020204030204" pitchFamily="34" charset="0"/>
+              <a:cs typeface="Calibri" panose="020F0502020204030204" pitchFamily="34" charset="0"/>
             </a:endParaRPr>
           </a:p>
           <a:p>
@@ -22180,14 +22700,19 @@
               <a:buChar char="-"/>
             </a:pPr>
             <a:r>
-              <a:rPr lang="en-GB">
+              <a:rPr lang="en-GB" dirty="0">
                 <a:solidFill>
                   <a:schemeClr val="dk1"/>
                 </a:solidFill>
+                <a:latin typeface="Calibri" panose="020F0502020204030204" pitchFamily="34" charset="0"/>
+                <a:cs typeface="Calibri" panose="020F0502020204030204" pitchFamily="34" charset="0"/>
               </a:rPr>
               <a:t>Show an error if unsuccessful</a:t>
             </a:r>
-            <a:endParaRPr/>
+            <a:endParaRPr dirty="0">
+              <a:latin typeface="Calibri" panose="020F0502020204030204" pitchFamily="34" charset="0"/>
+              <a:cs typeface="Calibri" panose="020F0502020204030204" pitchFamily="34" charset="0"/>
+            </a:endParaRPr>
           </a:p>
           <a:p>
             <a:pPr marL="457200" lvl="0" indent="0" algn="l" rtl="0">
@@ -22199,7 +22724,10 @@
               </a:spcAft>
               <a:buNone/>
             </a:pPr>
-            <a:endParaRPr/>
+            <a:endParaRPr dirty="0">
+              <a:latin typeface="Calibri" panose="020F0502020204030204" pitchFamily="34" charset="0"/>
+              <a:cs typeface="Calibri" panose="020F0502020204030204" pitchFamily="34" charset="0"/>
+            </a:endParaRPr>
           </a:p>
           <a:p>
             <a:pPr marL="0" lvl="0" indent="0" algn="l" rtl="0">
@@ -22212,10 +22740,16 @@
               <a:buNone/>
             </a:pPr>
             <a:r>
-              <a:rPr lang="en-GB"/>
+              <a:rPr lang="en-GB" b="1" dirty="0">
+                <a:latin typeface="Calibri" panose="020F0502020204030204" pitchFamily="34" charset="0"/>
+                <a:cs typeface="Calibri" panose="020F0502020204030204" pitchFamily="34" charset="0"/>
+              </a:rPr>
               <a:t>Integration with invoice:</a:t>
             </a:r>
-            <a:endParaRPr/>
+            <a:endParaRPr b="1" dirty="0">
+              <a:latin typeface="Calibri" panose="020F0502020204030204" pitchFamily="34" charset="0"/>
+              <a:cs typeface="Calibri" panose="020F0502020204030204" pitchFamily="34" charset="0"/>
+            </a:endParaRPr>
           </a:p>
           <a:p>
             <a:pPr marL="457200" lvl="0" indent="-317500" algn="l" rtl="0">
@@ -22232,14 +22766,19 @@
               <a:buChar char="-"/>
             </a:pPr>
             <a:r>
-              <a:rPr lang="en-GB">
+              <a:rPr lang="en-GB" dirty="0">
                 <a:solidFill>
                   <a:schemeClr val="dk1"/>
                 </a:solidFill>
+                <a:latin typeface="Calibri" panose="020F0502020204030204" pitchFamily="34" charset="0"/>
+                <a:cs typeface="Calibri" panose="020F0502020204030204" pitchFamily="34" charset="0"/>
               </a:rPr>
               <a:t>Customers invoice is sent automatically</a:t>
             </a:r>
-            <a:endParaRPr/>
+            <a:endParaRPr dirty="0">
+              <a:latin typeface="Calibri" panose="020F0502020204030204" pitchFamily="34" charset="0"/>
+              <a:cs typeface="Calibri" panose="020F0502020204030204" pitchFamily="34" charset="0"/>
+            </a:endParaRPr>
           </a:p>
           <a:p>
             <a:pPr marL="457200" lvl="0" indent="-317500" algn="l" rtl="0">
@@ -22253,10 +22792,16 @@
               <a:buChar char="-"/>
             </a:pPr>
             <a:r>
-              <a:rPr lang="en-GB"/>
+              <a:rPr lang="en-GB" dirty="0">
+                <a:latin typeface="Calibri" panose="020F0502020204030204" pitchFamily="34" charset="0"/>
+                <a:cs typeface="Calibri" panose="020F0502020204030204" pitchFamily="34" charset="0"/>
+              </a:rPr>
               <a:t>Send a post request from the mobile app to the current invoice system automatically after the users payment is confirmed.</a:t>
             </a:r>
-            <a:endParaRPr/>
+            <a:endParaRPr dirty="0">
+              <a:latin typeface="Calibri" panose="020F0502020204030204" pitchFamily="34" charset="0"/>
+              <a:cs typeface="Calibri" panose="020F0502020204030204" pitchFamily="34" charset="0"/>
+            </a:endParaRPr>
           </a:p>
         </p:txBody>
       </p:sp>

</xml_diff>